<commit_message>
slides: minor modifications to inheritance and composition
</commit_message>
<xml_diff>
--- a/slides/inheritance_composition.pptx
+++ b/slides/inheritance_composition.pptx
@@ -5,7 +5,7 @@
     <p:sldMasterId id="2147484294" r:id="rId1"/>
   </p:sldMasterIdLst>
   <p:notesMasterIdLst>
-    <p:notesMasterId r:id="rId26"/>
+    <p:notesMasterId r:id="rId27"/>
   </p:notesMasterIdLst>
   <p:sldIdLst>
     <p:sldId id="256" r:id="rId2"/>
@@ -19,19 +19,20 @@
     <p:sldId id="264" r:id="rId10"/>
     <p:sldId id="265" r:id="rId11"/>
     <p:sldId id="266" r:id="rId12"/>
-    <p:sldId id="277" r:id="rId13"/>
-    <p:sldId id="278" r:id="rId14"/>
-    <p:sldId id="267" r:id="rId15"/>
-    <p:sldId id="268" r:id="rId16"/>
-    <p:sldId id="269" r:id="rId17"/>
-    <p:sldId id="270" r:id="rId18"/>
-    <p:sldId id="271" r:id="rId19"/>
-    <p:sldId id="272" r:id="rId20"/>
-    <p:sldId id="273" r:id="rId21"/>
-    <p:sldId id="274" r:id="rId22"/>
-    <p:sldId id="275" r:id="rId23"/>
-    <p:sldId id="276" r:id="rId24"/>
-    <p:sldId id="279" r:id="rId25"/>
+    <p:sldId id="280" r:id="rId13"/>
+    <p:sldId id="277" r:id="rId14"/>
+    <p:sldId id="278" r:id="rId15"/>
+    <p:sldId id="267" r:id="rId16"/>
+    <p:sldId id="268" r:id="rId17"/>
+    <p:sldId id="269" r:id="rId18"/>
+    <p:sldId id="270" r:id="rId19"/>
+    <p:sldId id="271" r:id="rId20"/>
+    <p:sldId id="272" r:id="rId21"/>
+    <p:sldId id="273" r:id="rId22"/>
+    <p:sldId id="274" r:id="rId23"/>
+    <p:sldId id="275" r:id="rId24"/>
+    <p:sldId id="276" r:id="rId25"/>
+    <p:sldId id="279" r:id="rId26"/>
   </p:sldIdLst>
   <p:sldSz cx="12192000" cy="6858000"/>
   <p:notesSz cx="6858000" cy="9144000"/>
@@ -220,7 +221,7 @@
           <a:p>
             <a:fld id="{C24E9693-3B1A-6144-852A-5B7733F5E2A6}" type="datetimeFigureOut">
               <a:rPr lang="en-US" smtClean="0"/>
-              <a:t>5/14/20</a:t>
+              <a:t>5/20/20</a:t>
             </a:fld>
             <a:endParaRPr lang="en-US"/>
           </a:p>
@@ -569,7 +570,7 @@
           <a:p>
             <a:fld id="{BDAAE321-3917-0140-B87E-FBAD3B4B5EF6}" type="slidenum">
               <a:rPr lang="en-US" smtClean="0"/>
-              <a:t>17</a:t>
+              <a:t>18</a:t>
             </a:fld>
             <a:endParaRPr lang="en-US"/>
           </a:p>
@@ -669,7 +670,7 @@
           <a:p>
             <a:fld id="{BDAAE321-3917-0140-B87E-FBAD3B4B5EF6}" type="slidenum">
               <a:rPr lang="en-US" smtClean="0"/>
-              <a:t>18</a:t>
+              <a:t>19</a:t>
             </a:fld>
             <a:endParaRPr lang="en-US"/>
           </a:p>
@@ -769,7 +770,7 @@
           <a:p>
             <a:fld id="{BDAAE321-3917-0140-B87E-FBAD3B4B5EF6}" type="slidenum">
               <a:rPr lang="en-US" smtClean="0"/>
-              <a:t>19</a:t>
+              <a:t>20</a:t>
             </a:fld>
             <a:endParaRPr lang="en-US"/>
           </a:p>
@@ -861,7 +862,7 @@
           <a:p>
             <a:fld id="{BDAAE321-3917-0140-B87E-FBAD3B4B5EF6}" type="slidenum">
               <a:rPr lang="en-US" smtClean="0"/>
-              <a:t>24</a:t>
+              <a:t>25</a:t>
             </a:fld>
             <a:endParaRPr lang="en-US"/>
           </a:p>
@@ -1158,7 +1159,7 @@
           <a:p>
             <a:fld id="{51673806-0BCD-1F42-BAA8-2011034B3C6A}" type="datetimeFigureOut">
               <a:rPr lang="en-US" smtClean="0"/>
-              <a:t>5/14/20</a:t>
+              <a:t>5/20/20</a:t>
             </a:fld>
             <a:endParaRPr lang="en-US"/>
           </a:p>
@@ -1579,7 +1580,7 @@
           <a:p>
             <a:fld id="{51673806-0BCD-1F42-BAA8-2011034B3C6A}" type="datetimeFigureOut">
               <a:rPr lang="en-US" smtClean="0"/>
-              <a:t>5/14/20</a:t>
+              <a:t>5/20/20</a:t>
             </a:fld>
             <a:endParaRPr lang="en-US"/>
           </a:p>
@@ -1910,7 +1911,7 @@
           <a:p>
             <a:fld id="{51673806-0BCD-1F42-BAA8-2011034B3C6A}" type="datetimeFigureOut">
               <a:rPr lang="en-US" smtClean="0"/>
-              <a:t>5/14/20</a:t>
+              <a:t>5/20/20</a:t>
             </a:fld>
             <a:endParaRPr lang="en-US"/>
           </a:p>
@@ -2310,7 +2311,7 @@
           <a:p>
             <a:fld id="{51673806-0BCD-1F42-BAA8-2011034B3C6A}" type="datetimeFigureOut">
               <a:rPr lang="en-US" smtClean="0"/>
-              <a:t>5/14/20</a:t>
+              <a:t>5/20/20</a:t>
             </a:fld>
             <a:endParaRPr lang="en-US"/>
           </a:p>
@@ -2873,7 +2874,7 @@
           <a:p>
             <a:fld id="{51673806-0BCD-1F42-BAA8-2011034B3C6A}" type="datetimeFigureOut">
               <a:rPr lang="en-US" smtClean="0"/>
-              <a:t>5/14/20</a:t>
+              <a:t>5/20/20</a:t>
             </a:fld>
             <a:endParaRPr lang="en-US"/>
           </a:p>
@@ -3549,7 +3550,7 @@
           <a:p>
             <a:fld id="{51673806-0BCD-1F42-BAA8-2011034B3C6A}" type="datetimeFigureOut">
               <a:rPr lang="en-US" smtClean="0"/>
-              <a:t>5/14/20</a:t>
+              <a:t>5/20/20</a:t>
             </a:fld>
             <a:endParaRPr lang="en-US"/>
           </a:p>
@@ -4457,7 +4458,7 @@
           <a:p>
             <a:fld id="{51673806-0BCD-1F42-BAA8-2011034B3C6A}" type="datetimeFigureOut">
               <a:rPr lang="en-US" smtClean="0"/>
-              <a:t>5/14/20</a:t>
+              <a:t>5/20/20</a:t>
             </a:fld>
             <a:endParaRPr lang="en-US"/>
           </a:p>
@@ -4765,7 +4766,7 @@
           <a:p>
             <a:fld id="{51673806-0BCD-1F42-BAA8-2011034B3C6A}" type="datetimeFigureOut">
               <a:rPr lang="en-US" smtClean="0"/>
-              <a:t>5/14/20</a:t>
+              <a:t>5/20/20</a:t>
             </a:fld>
             <a:endParaRPr lang="en-US"/>
           </a:p>
@@ -5031,7 +5032,7 @@
           <a:p>
             <a:fld id="{51673806-0BCD-1F42-BAA8-2011034B3C6A}" type="datetimeFigureOut">
               <a:rPr lang="en-US" smtClean="0"/>
-              <a:t>5/14/20</a:t>
+              <a:t>5/20/20</a:t>
             </a:fld>
             <a:endParaRPr lang="en-US"/>
           </a:p>
@@ -5361,7 +5362,7 @@
           <a:p>
             <a:fld id="{51673806-0BCD-1F42-BAA8-2011034B3C6A}" type="datetimeFigureOut">
               <a:rPr lang="en-US" smtClean="0"/>
-              <a:t>5/14/20</a:t>
+              <a:t>5/20/20</a:t>
             </a:fld>
             <a:endParaRPr lang="en-US"/>
           </a:p>
@@ -5752,7 +5753,7 @@
           <a:p>
             <a:fld id="{51673806-0BCD-1F42-BAA8-2011034B3C6A}" type="datetimeFigureOut">
               <a:rPr lang="en-US" smtClean="0"/>
-              <a:t>5/14/20</a:t>
+              <a:t>5/20/20</a:t>
             </a:fld>
             <a:endParaRPr lang="en-US"/>
           </a:p>
@@ -6128,7 +6129,7 @@
           <a:p>
             <a:fld id="{51673806-0BCD-1F42-BAA8-2011034B3C6A}" type="datetimeFigureOut">
               <a:rPr lang="en-US" smtClean="0"/>
-              <a:t>5/14/20</a:t>
+              <a:t>5/20/20</a:t>
             </a:fld>
             <a:endParaRPr lang="en-US"/>
           </a:p>
@@ -6634,7 +6635,7 @@
           <a:p>
             <a:fld id="{51673806-0BCD-1F42-BAA8-2011034B3C6A}" type="datetimeFigureOut">
               <a:rPr lang="en-US" smtClean="0"/>
-              <a:t>5/14/20</a:t>
+              <a:t>5/20/20</a:t>
             </a:fld>
             <a:endParaRPr lang="en-US"/>
           </a:p>
@@ -6891,7 +6892,7 @@
           <a:p>
             <a:fld id="{51673806-0BCD-1F42-BAA8-2011034B3C6A}" type="datetimeFigureOut">
               <a:rPr lang="en-US" smtClean="0"/>
-              <a:t>5/14/20</a:t>
+              <a:t>5/20/20</a:t>
             </a:fld>
             <a:endParaRPr lang="en-US"/>
           </a:p>
@@ -7049,7 +7050,7 @@
           <a:p>
             <a:fld id="{51673806-0BCD-1F42-BAA8-2011034B3C6A}" type="datetimeFigureOut">
               <a:rPr lang="en-US" smtClean="0"/>
-              <a:t>5/14/20</a:t>
+              <a:t>5/20/20</a:t>
             </a:fld>
             <a:endParaRPr lang="en-US"/>
           </a:p>
@@ -7439,7 +7440,7 @@
           <a:p>
             <a:fld id="{51673806-0BCD-1F42-BAA8-2011034B3C6A}" type="datetimeFigureOut">
               <a:rPr lang="en-US" smtClean="0"/>
-              <a:t>5/14/20</a:t>
+              <a:t>5/20/20</a:t>
             </a:fld>
             <a:endParaRPr lang="en-US"/>
           </a:p>
@@ -7848,7 +7849,7 @@
           <a:p>
             <a:fld id="{51673806-0BCD-1F42-BAA8-2011034B3C6A}" type="datetimeFigureOut">
               <a:rPr lang="en-US" smtClean="0"/>
-              <a:t>5/14/20</a:t>
+              <a:t>5/20/20</a:t>
             </a:fld>
             <a:endParaRPr lang="en-US"/>
           </a:p>
@@ -8096,7 +8097,7 @@
             <a:fld id="{51673806-0BCD-1F42-BAA8-2011034B3C6A}" type="datetimeFigureOut">
               <a:rPr lang="en-US" smtClean="0"/>
               <a:pPr/>
-              <a:t>5/14/20</a:t>
+              <a:t>5/20/20</a:t>
             </a:fld>
             <a:endParaRPr lang="en-US" dirty="0"/>
           </a:p>
@@ -9210,7 +9211,15 @@
           <a:p>
             <a:r>
               <a:rPr lang="en-US" dirty="0" smtClean="0"/>
-              <a:t>This Includes Exceptions and Warnings </a:t>
+              <a:t>Inheritance: </a:t>
+            </a:r>
+            <a:r>
+              <a:rPr lang="en-US" dirty="0" err="1" smtClean="0"/>
+              <a:t>Subclassing</a:t>
+            </a:r>
+            <a:r>
+              <a:rPr lang="en-US" dirty="0" smtClean="0"/>
+              <a:t> Built-Ins </a:t>
             </a:r>
             <a:endParaRPr lang="en-US" dirty="0"/>
           </a:p>
@@ -9228,8 +9237,8 @@
         </p:nvSpPr>
         <p:spPr>
           <a:xfrm>
-            <a:off x="368490" y="2336873"/>
-            <a:ext cx="3985146" cy="3599316"/>
+            <a:off x="464024" y="2336872"/>
+            <a:ext cx="4585647" cy="4282291"/>
           </a:xfrm>
         </p:spPr>
         <p:txBody>
@@ -9253,34 +9262,7 @@
               <a:tabLst/>
               <a:defRPr/>
             </a:pPr>
-            <a:r>
-              <a:rPr lang="en-US" dirty="0" smtClean="0"/>
-              <a:t>You can create your own </a:t>
-            </a:r>
-            <a:r>
-              <a:rPr lang="en-US" i="1" dirty="0" smtClean="0"/>
-              <a:t>Exception</a:t>
-            </a:r>
-            <a:r>
-              <a:rPr lang="en-US" dirty="0" smtClean="0"/>
-              <a:t> and </a:t>
-            </a:r>
-            <a:r>
-              <a:rPr lang="en-US" i="1" dirty="0" smtClean="0"/>
-              <a:t>Warning </a:t>
-            </a:r>
-            <a:r>
-              <a:rPr lang="en-US" dirty="0" smtClean="0"/>
-              <a:t>classes by </a:t>
-            </a:r>
-            <a:r>
-              <a:rPr lang="en-US" dirty="0" err="1" smtClean="0"/>
-              <a:t>subclassing</a:t>
-            </a:r>
-            <a:r>
-              <a:rPr lang="en-US" dirty="0" smtClean="0"/>
-              <a:t> these built-in types </a:t>
-            </a:r>
+            <a:endParaRPr lang="en-US" dirty="0" smtClean="0"/>
           </a:p>
           <a:p>
             <a:pPr marL="0" marR="0" lvl="0" indent="0" defTabSz="914400" eaLnBrk="1" fontAlgn="auto" latinLnBrk="0" hangingPunct="1">
@@ -9300,7 +9282,7 @@
               <a:tabLst/>
               <a:defRPr/>
             </a:pPr>
-            <a:endParaRPr lang="en-US" dirty="0" smtClean="0"/>
+            <a:endParaRPr lang="en-US" dirty="0"/>
           </a:p>
           <a:p>
             <a:pPr marL="0" marR="0" lvl="0" indent="0" defTabSz="914400" eaLnBrk="1" fontAlgn="auto" latinLnBrk="0" hangingPunct="1">
@@ -9320,31 +9302,10 @@
               <a:tabLst/>
               <a:defRPr/>
             </a:pPr>
-            <a:endParaRPr lang="en-US" dirty="0"/>
-          </a:p>
-          <a:p>
-            <a:pPr marL="0" marR="0" lvl="0" indent="0" defTabSz="914400" eaLnBrk="1" fontAlgn="auto" latinLnBrk="0" hangingPunct="1">
-              <a:lnSpc>
-                <a:spcPct val="100000"/>
-              </a:lnSpc>
-              <a:spcBef>
-                <a:spcPts val="0"/>
-              </a:spcBef>
-              <a:spcAft>
-                <a:spcPts val="0"/>
-              </a:spcAft>
-              <a:buClrTx/>
-              <a:buSzTx/>
-              <a:buFontTx/>
-              <a:buNone/>
-              <a:tabLst/>
-              <a:defRPr/>
-            </a:pPr>
             <a:r>
               <a:rPr lang="en-US" dirty="0" smtClean="0"/>
-              <a:t>Unless you want to do something special, this only requires two lines</a:t>
-            </a:r>
-            <a:endParaRPr lang="en-US" dirty="0"/>
+              <a:t>All of the features and behavior of the list are inherited, with the modification that this only allows integers </a:t>
+            </a:r>
           </a:p>
         </p:txBody>
       </p:sp>
@@ -9370,8 +9331,8 @@
         </p:blipFill>
         <p:spPr>
           <a:xfrm>
-            <a:off x="4561386" y="2052531"/>
-            <a:ext cx="7518400" cy="4749800"/>
+            <a:off x="6804358" y="1596789"/>
+            <a:ext cx="4956795" cy="5152029"/>
           </a:xfrm>
           <a:prstGeom prst="rect">
             <a:avLst/>
@@ -9381,7 +9342,7 @@
     </p:spTree>
     <p:extLst>
       <p:ext uri="{BB962C8B-B14F-4D97-AF65-F5344CB8AC3E}">
-        <p14:creationId xmlns:p14="http://schemas.microsoft.com/office/powerpoint/2010/main" val="1381970054"/>
+        <p14:creationId xmlns:p14="http://schemas.microsoft.com/office/powerpoint/2010/main" val="2077385157"/>
       </p:ext>
     </p:extLst>
   </p:cSld>
@@ -9432,7 +9393,7 @@
           <a:p>
             <a:r>
               <a:rPr lang="en-US" dirty="0" smtClean="0"/>
-              <a:t>Recall: The Python Model </a:t>
+              <a:t>This Includes Exceptions and Warnings </a:t>
             </a:r>
             <a:endParaRPr lang="en-US" dirty="0"/>
           </a:p>
@@ -9450,8 +9411,8 @@
         </p:nvSpPr>
         <p:spPr>
           <a:xfrm>
-            <a:off x="680321" y="2336873"/>
-            <a:ext cx="5597649" cy="3599316"/>
+            <a:off x="368490" y="2336873"/>
+            <a:ext cx="3985146" cy="3599316"/>
           </a:xfrm>
         </p:spPr>
         <p:txBody>
@@ -9476,10 +9437,33 @@
               <a:defRPr/>
             </a:pPr>
             <a:r>
+              <a:rPr lang="en-US" dirty="0" smtClean="0"/>
+              <a:t>You can create your own </a:t>
+            </a:r>
+            <a:r>
               <a:rPr lang="en-US" i="1" dirty="0" smtClean="0"/>
-              <a:t>Everything is an object </a:t>
-            </a:r>
-            <a:endParaRPr lang="en-US" dirty="0" smtClean="0"/>
+              <a:t>Exception</a:t>
+            </a:r>
+            <a:r>
+              <a:rPr lang="en-US" dirty="0" smtClean="0"/>
+              <a:t> and </a:t>
+            </a:r>
+            <a:r>
+              <a:rPr lang="en-US" i="1" dirty="0" smtClean="0"/>
+              <a:t>Warning </a:t>
+            </a:r>
+            <a:r>
+              <a:rPr lang="en-US" dirty="0" smtClean="0"/>
+              <a:t>classes by </a:t>
+            </a:r>
+            <a:r>
+              <a:rPr lang="en-US" dirty="0" err="1" smtClean="0"/>
+              <a:t>subclassing</a:t>
+            </a:r>
+            <a:r>
+              <a:rPr lang="en-US" dirty="0" smtClean="0"/>
+              <a:t> these built-in types </a:t>
+            </a:r>
           </a:p>
           <a:p>
             <a:pPr marL="0" marR="0" lvl="0" indent="0" defTabSz="914400" eaLnBrk="1" fontAlgn="auto" latinLnBrk="0" hangingPunct="1">
@@ -9519,7 +9503,7 @@
               <a:tabLst/>
               <a:defRPr/>
             </a:pPr>
-            <a:endParaRPr lang="en-US" dirty="0" smtClean="0"/>
+            <a:endParaRPr lang="en-US" dirty="0"/>
           </a:p>
           <a:p>
             <a:pPr marL="0" marR="0" lvl="0" indent="0" defTabSz="914400" eaLnBrk="1" fontAlgn="auto" latinLnBrk="0" hangingPunct="1">
@@ -9541,113 +9525,9 @@
             </a:pPr>
             <a:r>
               <a:rPr lang="en-US" dirty="0" smtClean="0"/>
-              <a:t>At the end of the day, </a:t>
-            </a:r>
-            <a:r>
-              <a:rPr lang="en-US" i="1" dirty="0" smtClean="0"/>
-              <a:t>everything</a:t>
-            </a:r>
-            <a:r>
-              <a:rPr lang="en-US" dirty="0" smtClean="0"/>
-              <a:t> inherits from </a:t>
-            </a:r>
-            <a:r>
-              <a:rPr lang="en-US" i="1" dirty="0" smtClean="0"/>
-              <a:t>object</a:t>
-            </a:r>
-            <a:r>
-              <a:rPr lang="en-US" dirty="0"/>
-              <a:t> </a:t>
-            </a:r>
-            <a:endParaRPr lang="en-US" dirty="0" smtClean="0"/>
-          </a:p>
-          <a:p>
-            <a:pPr marL="0" marR="0" lvl="0" indent="0" defTabSz="914400" eaLnBrk="1" fontAlgn="auto" latinLnBrk="0" hangingPunct="1">
-              <a:lnSpc>
-                <a:spcPct val="100000"/>
-              </a:lnSpc>
-              <a:spcBef>
-                <a:spcPts val="0"/>
-              </a:spcBef>
-              <a:spcAft>
-                <a:spcPts val="0"/>
-              </a:spcAft>
-              <a:buClrTx/>
-              <a:buSzTx/>
-              <a:buFontTx/>
-              <a:buNone/>
-              <a:tabLst/>
-              <a:defRPr/>
-            </a:pPr>
-            <a:endParaRPr lang="en-US" i="1" dirty="0"/>
-          </a:p>
-          <a:p>
-            <a:pPr marL="0" marR="0" lvl="0" indent="0" defTabSz="914400" eaLnBrk="1" fontAlgn="auto" latinLnBrk="0" hangingPunct="1">
-              <a:lnSpc>
-                <a:spcPct val="100000"/>
-              </a:lnSpc>
-              <a:spcBef>
-                <a:spcPts val="0"/>
-              </a:spcBef>
-              <a:spcAft>
-                <a:spcPts val="0"/>
-              </a:spcAft>
-              <a:buClrTx/>
-              <a:buSzTx/>
-              <a:buFontTx/>
-              <a:buNone/>
-              <a:tabLst/>
-              <a:defRPr/>
-            </a:pPr>
-            <a:endParaRPr lang="en-US" i="1" dirty="0" smtClean="0"/>
-          </a:p>
-          <a:p>
-            <a:pPr marL="0" marR="0" lvl="0" indent="0" defTabSz="914400" eaLnBrk="1" fontAlgn="auto" latinLnBrk="0" hangingPunct="1">
-              <a:lnSpc>
-                <a:spcPct val="100000"/>
-              </a:lnSpc>
-              <a:spcBef>
-                <a:spcPts val="0"/>
-              </a:spcBef>
-              <a:spcAft>
-                <a:spcPts val="0"/>
-              </a:spcAft>
-              <a:buClrTx/>
-              <a:buSzTx/>
-              <a:buFontTx/>
-              <a:buNone/>
-              <a:tabLst/>
-              <a:defRPr/>
-            </a:pPr>
-            <a:r>
-              <a:rPr lang="en-US" i="1" dirty="0" err="1" smtClean="0"/>
-              <a:t>isinstance</a:t>
-            </a:r>
-            <a:r>
-              <a:rPr lang="en-US" i="1" dirty="0" smtClean="0"/>
-              <a:t>(x, object)</a:t>
-            </a:r>
-            <a:r>
-              <a:rPr lang="en-US" dirty="0" smtClean="0"/>
-              <a:t> will </a:t>
-            </a:r>
-            <a:r>
-              <a:rPr lang="en-US" b="1" i="1" dirty="0" smtClean="0"/>
-              <a:t>always </a:t>
-            </a:r>
-            <a:r>
-              <a:rPr lang="en-US" dirty="0" smtClean="0"/>
-              <a:t>return </a:t>
-            </a:r>
-            <a:r>
-              <a:rPr lang="en-US" i="1" dirty="0" smtClean="0"/>
-              <a:t>True</a:t>
-            </a:r>
-            <a:r>
-              <a:rPr lang="en-US" dirty="0"/>
-              <a:t> </a:t>
-            </a:r>
-            <a:endParaRPr lang="en-US" i="1" dirty="0"/>
+              <a:t>Unless you want to do something special, this only requires two lines</a:t>
+            </a:r>
+            <a:endParaRPr lang="en-US" dirty="0"/>
           </a:p>
         </p:txBody>
       </p:sp>
@@ -9673,8 +9553,8 @@
         </p:blipFill>
         <p:spPr>
           <a:xfrm>
-            <a:off x="6705031" y="2656981"/>
-            <a:ext cx="3886200" cy="2959100"/>
+            <a:off x="4561386" y="2052531"/>
+            <a:ext cx="7518400" cy="4749800"/>
           </a:xfrm>
           <a:prstGeom prst="rect">
             <a:avLst/>
@@ -9684,7 +9564,7 @@
     </p:spTree>
     <p:extLst>
       <p:ext uri="{BB962C8B-B14F-4D97-AF65-F5344CB8AC3E}">
-        <p14:creationId xmlns:p14="http://schemas.microsoft.com/office/powerpoint/2010/main" val="1195106245"/>
+        <p14:creationId xmlns:p14="http://schemas.microsoft.com/office/powerpoint/2010/main" val="1381970054"/>
       </p:ext>
     </p:extLst>
   </p:cSld>
@@ -9735,6 +9615,309 @@
           <a:p>
             <a:r>
               <a:rPr lang="en-US" dirty="0" smtClean="0"/>
+              <a:t>Recall: The Python Model </a:t>
+            </a:r>
+            <a:endParaRPr lang="en-US" dirty="0"/>
+          </a:p>
+        </p:txBody>
+      </p:sp>
+      <p:sp>
+        <p:nvSpPr>
+          <p:cNvPr id="3" name="Content Placeholder 2"/>
+          <p:cNvSpPr>
+            <a:spLocks noGrp="1"/>
+          </p:cNvSpPr>
+          <p:nvPr>
+            <p:ph idx="1"/>
+          </p:nvPr>
+        </p:nvSpPr>
+        <p:spPr>
+          <a:xfrm>
+            <a:off x="680321" y="2336873"/>
+            <a:ext cx="5597649" cy="3599316"/>
+          </a:xfrm>
+        </p:spPr>
+        <p:txBody>
+          <a:bodyPr/>
+          <a:lstStyle/>
+          <a:p>
+            <a:pPr marL="0" marR="0" lvl="0" indent="0" defTabSz="914400" eaLnBrk="1" fontAlgn="auto" latinLnBrk="0" hangingPunct="1">
+              <a:lnSpc>
+                <a:spcPct val="100000"/>
+              </a:lnSpc>
+              <a:spcBef>
+                <a:spcPts val="0"/>
+              </a:spcBef>
+              <a:spcAft>
+                <a:spcPts val="0"/>
+              </a:spcAft>
+              <a:buClrTx/>
+              <a:buSzTx/>
+              <a:buFontTx/>
+              <a:buNone/>
+              <a:tabLst/>
+              <a:defRPr/>
+            </a:pPr>
+            <a:r>
+              <a:rPr lang="en-US" i="1" dirty="0" smtClean="0"/>
+              <a:t>Everything is an object </a:t>
+            </a:r>
+            <a:endParaRPr lang="en-US" dirty="0" smtClean="0"/>
+          </a:p>
+          <a:p>
+            <a:pPr marL="0" marR="0" lvl="0" indent="0" defTabSz="914400" eaLnBrk="1" fontAlgn="auto" latinLnBrk="0" hangingPunct="1">
+              <a:lnSpc>
+                <a:spcPct val="100000"/>
+              </a:lnSpc>
+              <a:spcBef>
+                <a:spcPts val="0"/>
+              </a:spcBef>
+              <a:spcAft>
+                <a:spcPts val="0"/>
+              </a:spcAft>
+              <a:buClrTx/>
+              <a:buSzTx/>
+              <a:buFontTx/>
+              <a:buNone/>
+              <a:tabLst/>
+              <a:defRPr/>
+            </a:pPr>
+            <a:endParaRPr lang="en-US" dirty="0" smtClean="0"/>
+          </a:p>
+          <a:p>
+            <a:pPr marL="0" marR="0" lvl="0" indent="0" defTabSz="914400" eaLnBrk="1" fontAlgn="auto" latinLnBrk="0" hangingPunct="1">
+              <a:lnSpc>
+                <a:spcPct val="100000"/>
+              </a:lnSpc>
+              <a:spcBef>
+                <a:spcPts val="0"/>
+              </a:spcBef>
+              <a:spcAft>
+                <a:spcPts val="0"/>
+              </a:spcAft>
+              <a:buClrTx/>
+              <a:buSzTx/>
+              <a:buFontTx/>
+              <a:buNone/>
+              <a:tabLst/>
+              <a:defRPr/>
+            </a:pPr>
+            <a:endParaRPr lang="en-US" dirty="0" smtClean="0"/>
+          </a:p>
+          <a:p>
+            <a:pPr marL="0" marR="0" lvl="0" indent="0" defTabSz="914400" eaLnBrk="1" fontAlgn="auto" latinLnBrk="0" hangingPunct="1">
+              <a:lnSpc>
+                <a:spcPct val="100000"/>
+              </a:lnSpc>
+              <a:spcBef>
+                <a:spcPts val="0"/>
+              </a:spcBef>
+              <a:spcAft>
+                <a:spcPts val="0"/>
+              </a:spcAft>
+              <a:buClrTx/>
+              <a:buSzTx/>
+              <a:buFontTx/>
+              <a:buNone/>
+              <a:tabLst/>
+              <a:defRPr/>
+            </a:pPr>
+            <a:r>
+              <a:rPr lang="en-US" dirty="0" smtClean="0"/>
+              <a:t>At the end of the day, </a:t>
+            </a:r>
+            <a:r>
+              <a:rPr lang="en-US" i="1" dirty="0" smtClean="0"/>
+              <a:t>everything</a:t>
+            </a:r>
+            <a:r>
+              <a:rPr lang="en-US" dirty="0" smtClean="0"/>
+              <a:t> inherits from </a:t>
+            </a:r>
+            <a:r>
+              <a:rPr lang="en-US" i="1" dirty="0" smtClean="0"/>
+              <a:t>object</a:t>
+            </a:r>
+            <a:r>
+              <a:rPr lang="en-US" dirty="0"/>
+              <a:t> </a:t>
+            </a:r>
+            <a:endParaRPr lang="en-US" dirty="0" smtClean="0"/>
+          </a:p>
+          <a:p>
+            <a:pPr marL="0" marR="0" lvl="0" indent="0" defTabSz="914400" eaLnBrk="1" fontAlgn="auto" latinLnBrk="0" hangingPunct="1">
+              <a:lnSpc>
+                <a:spcPct val="100000"/>
+              </a:lnSpc>
+              <a:spcBef>
+                <a:spcPts val="0"/>
+              </a:spcBef>
+              <a:spcAft>
+                <a:spcPts val="0"/>
+              </a:spcAft>
+              <a:buClrTx/>
+              <a:buSzTx/>
+              <a:buFontTx/>
+              <a:buNone/>
+              <a:tabLst/>
+              <a:defRPr/>
+            </a:pPr>
+            <a:endParaRPr lang="en-US" i="1" dirty="0"/>
+          </a:p>
+          <a:p>
+            <a:pPr marL="0" marR="0" lvl="0" indent="0" defTabSz="914400" eaLnBrk="1" fontAlgn="auto" latinLnBrk="0" hangingPunct="1">
+              <a:lnSpc>
+                <a:spcPct val="100000"/>
+              </a:lnSpc>
+              <a:spcBef>
+                <a:spcPts val="0"/>
+              </a:spcBef>
+              <a:spcAft>
+                <a:spcPts val="0"/>
+              </a:spcAft>
+              <a:buClrTx/>
+              <a:buSzTx/>
+              <a:buFontTx/>
+              <a:buNone/>
+              <a:tabLst/>
+              <a:defRPr/>
+            </a:pPr>
+            <a:endParaRPr lang="en-US" i="1" dirty="0" smtClean="0"/>
+          </a:p>
+          <a:p>
+            <a:pPr marL="0" marR="0" lvl="0" indent="0" defTabSz="914400" eaLnBrk="1" fontAlgn="auto" latinLnBrk="0" hangingPunct="1">
+              <a:lnSpc>
+                <a:spcPct val="100000"/>
+              </a:lnSpc>
+              <a:spcBef>
+                <a:spcPts val="0"/>
+              </a:spcBef>
+              <a:spcAft>
+                <a:spcPts val="0"/>
+              </a:spcAft>
+              <a:buClrTx/>
+              <a:buSzTx/>
+              <a:buFontTx/>
+              <a:buNone/>
+              <a:tabLst/>
+              <a:defRPr/>
+            </a:pPr>
+            <a:r>
+              <a:rPr lang="en-US" i="1" dirty="0" err="1" smtClean="0"/>
+              <a:t>isinstance</a:t>
+            </a:r>
+            <a:r>
+              <a:rPr lang="en-US" i="1" dirty="0" smtClean="0"/>
+              <a:t>(x, object)</a:t>
+            </a:r>
+            <a:r>
+              <a:rPr lang="en-US" dirty="0" smtClean="0"/>
+              <a:t> will </a:t>
+            </a:r>
+            <a:r>
+              <a:rPr lang="en-US" b="1" i="1" dirty="0" smtClean="0"/>
+              <a:t>always </a:t>
+            </a:r>
+            <a:r>
+              <a:rPr lang="en-US" dirty="0" smtClean="0"/>
+              <a:t>return </a:t>
+            </a:r>
+            <a:r>
+              <a:rPr lang="en-US" i="1" dirty="0" smtClean="0"/>
+              <a:t>True</a:t>
+            </a:r>
+            <a:r>
+              <a:rPr lang="en-US" dirty="0"/>
+              <a:t> </a:t>
+            </a:r>
+            <a:endParaRPr lang="en-US" i="1" dirty="0"/>
+          </a:p>
+        </p:txBody>
+      </p:sp>
+      <p:pic>
+        <p:nvPicPr>
+          <p:cNvPr id="4" name="Picture 3"/>
+          <p:cNvPicPr>
+            <a:picLocks noChangeAspect="1"/>
+          </p:cNvPicPr>
+          <p:nvPr/>
+        </p:nvPicPr>
+        <p:blipFill>
+          <a:blip r:embed="rId2">
+            <a:extLst>
+              <a:ext uri="{28A0092B-C50C-407E-A947-70E740481C1C}">
+                <a14:useLocalDpi xmlns:a14="http://schemas.microsoft.com/office/drawing/2010/main" val="0"/>
+              </a:ext>
+            </a:extLst>
+          </a:blip>
+          <a:stretch>
+            <a:fillRect/>
+          </a:stretch>
+        </p:blipFill>
+        <p:spPr>
+          <a:xfrm>
+            <a:off x="6705031" y="2656981"/>
+            <a:ext cx="3886200" cy="2959100"/>
+          </a:xfrm>
+          <a:prstGeom prst="rect">
+            <a:avLst/>
+          </a:prstGeom>
+        </p:spPr>
+      </p:pic>
+    </p:spTree>
+    <p:extLst>
+      <p:ext uri="{BB962C8B-B14F-4D97-AF65-F5344CB8AC3E}">
+        <p14:creationId xmlns:p14="http://schemas.microsoft.com/office/powerpoint/2010/main" val="1195106245"/>
+      </p:ext>
+    </p:extLst>
+  </p:cSld>
+  <p:clrMapOvr>
+    <a:masterClrMapping/>
+  </p:clrMapOvr>
+  <p:timing>
+    <p:tnLst>
+      <p:par>
+        <p:cTn id="1" dur="indefinite" restart="never" nodeType="tmRoot"/>
+      </p:par>
+    </p:tnLst>
+  </p:timing>
+</p:sld>
+</file>
+
+<file path=ppt/slides/slide15.xml><?xml version="1.0" encoding="utf-8"?>
+<p:sld xmlns:a="http://schemas.openxmlformats.org/drawingml/2006/main" xmlns:r="http://schemas.openxmlformats.org/officeDocument/2006/relationships" xmlns:p="http://schemas.openxmlformats.org/presentationml/2006/main">
+  <p:cSld>
+    <p:spTree>
+      <p:nvGrpSpPr>
+        <p:cNvPr id="1" name=""/>
+        <p:cNvGrpSpPr/>
+        <p:nvPr/>
+      </p:nvGrpSpPr>
+      <p:grpSpPr>
+        <a:xfrm>
+          <a:off x="0" y="0"/>
+          <a:ext cx="0" cy="0"/>
+          <a:chOff x="0" y="0"/>
+          <a:chExt cx="0" cy="0"/>
+        </a:xfrm>
+      </p:grpSpPr>
+      <p:sp>
+        <p:nvSpPr>
+          <p:cNvPr id="2" name="Title 1"/>
+          <p:cNvSpPr>
+            <a:spLocks noGrp="1"/>
+          </p:cNvSpPr>
+          <p:nvPr>
+            <p:ph type="title"/>
+          </p:nvPr>
+        </p:nvSpPr>
+        <p:spPr/>
+        <p:txBody>
+          <a:bodyPr/>
+          <a:lstStyle/>
+          <a:p>
+            <a:r>
+              <a:rPr lang="en-US" dirty="0" smtClean="0"/>
               <a:t>Composition </a:t>
             </a:r>
             <a:endParaRPr lang="en-US" dirty="0"/>
@@ -9844,7 +10027,7 @@
 </p:sld>
 </file>
 
-<file path=ppt/slides/slide15.xml><?xml version="1.0" encoding="utf-8"?>
+<file path=ppt/slides/slide16.xml><?xml version="1.0" encoding="utf-8"?>
 <p:sld xmlns:a="http://schemas.openxmlformats.org/drawingml/2006/main" xmlns:r="http://schemas.openxmlformats.org/officeDocument/2006/relationships" xmlns:p="http://schemas.openxmlformats.org/presentationml/2006/main">
   <p:cSld>
     <p:spTree>
@@ -10648,7 +10831,7 @@
 </p:sld>
 </file>
 
-<file path=ppt/slides/slide16.xml><?xml version="1.0" encoding="utf-8"?>
+<file path=ppt/slides/slide17.xml><?xml version="1.0" encoding="utf-8"?>
 <p:sld xmlns:a="http://schemas.openxmlformats.org/drawingml/2006/main" xmlns:r="http://schemas.openxmlformats.org/officeDocument/2006/relationships" xmlns:p="http://schemas.openxmlformats.org/presentationml/2006/main">
   <p:cSld>
     <p:spTree>
@@ -10767,216 +10950,6 @@
     <p:extLst>
       <p:ext uri="{BB962C8B-B14F-4D97-AF65-F5344CB8AC3E}">
         <p14:creationId xmlns:p14="http://schemas.microsoft.com/office/powerpoint/2010/main" val="735303073"/>
-      </p:ext>
-    </p:extLst>
-  </p:cSld>
-  <p:clrMapOvr>
-    <a:masterClrMapping/>
-  </p:clrMapOvr>
-  <p:timing>
-    <p:tnLst>
-      <p:par>
-        <p:cTn id="1" dur="indefinite" restart="never" nodeType="tmRoot"/>
-      </p:par>
-    </p:tnLst>
-  </p:timing>
-</p:sld>
-</file>
-
-<file path=ppt/slides/slide17.xml><?xml version="1.0" encoding="utf-8"?>
-<p:sld xmlns:a="http://schemas.openxmlformats.org/drawingml/2006/main" xmlns:r="http://schemas.openxmlformats.org/officeDocument/2006/relationships" xmlns:p="http://schemas.openxmlformats.org/presentationml/2006/main">
-  <p:cSld>
-    <p:spTree>
-      <p:nvGrpSpPr>
-        <p:cNvPr id="1" name=""/>
-        <p:cNvGrpSpPr/>
-        <p:nvPr/>
-      </p:nvGrpSpPr>
-      <p:grpSpPr>
-        <a:xfrm>
-          <a:off x="0" y="0"/>
-          <a:ext cx="0" cy="0"/>
-          <a:chOff x="0" y="0"/>
-          <a:chExt cx="0" cy="0"/>
-        </a:xfrm>
-      </p:grpSpPr>
-      <p:sp>
-        <p:nvSpPr>
-          <p:cNvPr id="2" name="Title 1"/>
-          <p:cNvSpPr>
-            <a:spLocks noGrp="1"/>
-          </p:cNvSpPr>
-          <p:nvPr>
-            <p:ph type="title"/>
-          </p:nvPr>
-        </p:nvSpPr>
-        <p:spPr/>
-        <p:txBody>
-          <a:bodyPr/>
-          <a:lstStyle/>
-          <a:p>
-            <a:r>
-              <a:rPr lang="en-US" dirty="0" smtClean="0"/>
-              <a:t>Composition: A Solar System </a:t>
-            </a:r>
-            <a:endParaRPr lang="en-US" dirty="0"/>
-          </a:p>
-        </p:txBody>
-      </p:sp>
-      <p:sp>
-        <p:nvSpPr>
-          <p:cNvPr id="3" name="Content Placeholder 2"/>
-          <p:cNvSpPr>
-            <a:spLocks noGrp="1"/>
-          </p:cNvSpPr>
-          <p:nvPr>
-            <p:ph idx="1"/>
-          </p:nvPr>
-        </p:nvSpPr>
-        <p:spPr>
-          <a:xfrm>
-            <a:off x="680321" y="2336873"/>
-            <a:ext cx="5229160" cy="3599316"/>
-          </a:xfrm>
-        </p:spPr>
-        <p:txBody>
-          <a:bodyPr/>
-          <a:lstStyle/>
-          <a:p>
-            <a:pPr marL="0" marR="0" lvl="0" indent="0" defTabSz="914400" eaLnBrk="1" fontAlgn="auto" latinLnBrk="0" hangingPunct="1">
-              <a:lnSpc>
-                <a:spcPct val="100000"/>
-              </a:lnSpc>
-              <a:spcBef>
-                <a:spcPts val="0"/>
-              </a:spcBef>
-              <a:spcAft>
-                <a:spcPts val="0"/>
-              </a:spcAft>
-              <a:buClrTx/>
-              <a:buSzTx/>
-              <a:buFontTx/>
-              <a:buNone/>
-              <a:tabLst/>
-              <a:defRPr/>
-            </a:pPr>
-            <a:r>
-              <a:rPr lang="en-US" dirty="0" smtClean="0"/>
-              <a:t>First pieces: the inheritance structure of the solar system bodies. All solar system bodies have a name and a mass. </a:t>
-            </a:r>
-          </a:p>
-          <a:p>
-            <a:pPr marL="0" marR="0" lvl="0" indent="0" defTabSz="914400" eaLnBrk="1" fontAlgn="auto" latinLnBrk="0" hangingPunct="1">
-              <a:lnSpc>
-                <a:spcPct val="100000"/>
-              </a:lnSpc>
-              <a:spcBef>
-                <a:spcPts val="0"/>
-              </a:spcBef>
-              <a:spcAft>
-                <a:spcPts val="0"/>
-              </a:spcAft>
-              <a:buClrTx/>
-              <a:buSzTx/>
-              <a:buFontTx/>
-              <a:buNone/>
-              <a:tabLst/>
-              <a:defRPr/>
-            </a:pPr>
-            <a:endParaRPr lang="en-US" dirty="0"/>
-          </a:p>
-          <a:p>
-            <a:pPr marL="0" marR="0" lvl="0" indent="0" defTabSz="914400" eaLnBrk="1" fontAlgn="auto" latinLnBrk="0" hangingPunct="1">
-              <a:lnSpc>
-                <a:spcPct val="100000"/>
-              </a:lnSpc>
-              <a:spcBef>
-                <a:spcPts val="0"/>
-              </a:spcBef>
-              <a:spcAft>
-                <a:spcPts val="0"/>
-              </a:spcAft>
-              <a:buClrTx/>
-              <a:buSzTx/>
-              <a:buFontTx/>
-              <a:buNone/>
-              <a:tabLst/>
-              <a:defRPr/>
-            </a:pPr>
-            <a:r>
-              <a:rPr lang="en-US" dirty="0" smtClean="0"/>
-              <a:t>The star doesn’t need any more than this, so we can let it inherit </a:t>
-            </a:r>
-            <a:r>
-              <a:rPr lang="en-US" i="1" dirty="0" smtClean="0"/>
-              <a:t>everything</a:t>
-            </a:r>
-            <a:r>
-              <a:rPr lang="en-US" dirty="0" smtClean="0"/>
-              <a:t> </a:t>
-            </a:r>
-            <a:r>
-              <a:rPr lang="mr-IN" dirty="0" smtClean="0"/>
-              <a:t>–</a:t>
-            </a:r>
-            <a:r>
-              <a:rPr lang="en-US" dirty="0" smtClean="0"/>
-              <a:t> even the </a:t>
-            </a:r>
-            <a:r>
-              <a:rPr lang="en-US" i="1" dirty="0" smtClean="0"/>
-              <a:t>__</a:t>
-            </a:r>
-            <a:r>
-              <a:rPr lang="en-US" i="1" dirty="0" err="1" smtClean="0"/>
-              <a:t>init</a:t>
-            </a:r>
-            <a:r>
-              <a:rPr lang="en-US" i="1" dirty="0" smtClean="0"/>
-              <a:t>__</a:t>
-            </a:r>
-            <a:r>
-              <a:rPr lang="en-US" dirty="0" smtClean="0"/>
-              <a:t> function. </a:t>
-            </a:r>
-            <a:endParaRPr lang="en-US" dirty="0"/>
-          </a:p>
-        </p:txBody>
-      </p:sp>
-      <p:pic>
-        <p:nvPicPr>
-          <p:cNvPr id="5" name="Picture 4"/>
-          <p:cNvPicPr>
-            <a:picLocks noChangeAspect="1"/>
-          </p:cNvPicPr>
-          <p:nvPr/>
-        </p:nvPicPr>
-        <p:blipFill>
-          <a:blip r:embed="rId3">
-            <a:extLst>
-              <a:ext uri="{28A0092B-C50C-407E-A947-70E740481C1C}">
-                <a14:useLocalDpi xmlns:a14="http://schemas.microsoft.com/office/drawing/2010/main" val="0"/>
-              </a:ext>
-            </a:extLst>
-          </a:blip>
-          <a:stretch>
-            <a:fillRect/>
-          </a:stretch>
-        </p:blipFill>
-        <p:spPr>
-          <a:xfrm>
-            <a:off x="6409896" y="3803929"/>
-            <a:ext cx="2297375" cy="733884"/>
-          </a:xfrm>
-          <a:prstGeom prst="rect">
-            <a:avLst/>
-          </a:prstGeom>
-        </p:spPr>
-      </p:pic>
-    </p:spTree>
-    <p:extLst>
-      <p:ext uri="{BB962C8B-B14F-4D97-AF65-F5344CB8AC3E}">
-        <p14:creationId xmlns:p14="http://schemas.microsoft.com/office/powerpoint/2010/main" val="469453324"/>
       </p:ext>
     </p:extLst>
   </p:cSld>
@@ -11115,7 +11088,39 @@
             </a:pPr>
             <a:r>
               <a:rPr lang="en-US" dirty="0" smtClean="0"/>
-              <a:t>A satellite object also has a semi-major axis and an eccentricity. </a:t>
+              <a:t>The star doesn’t need any more than this, so we can let it inherit </a:t>
+            </a:r>
+            <a:r>
+              <a:rPr lang="en-US" i="1" dirty="0" smtClean="0"/>
+              <a:t>everything</a:t>
+            </a:r>
+            <a:r>
+              <a:rPr lang="en-US" dirty="0" smtClean="0"/>
+              <a:t> </a:t>
+            </a:r>
+            <a:r>
+              <a:rPr lang="mr-IN" dirty="0" smtClean="0"/>
+              <a:t>–</a:t>
+            </a:r>
+            <a:r>
+              <a:rPr lang="en-US" dirty="0" smtClean="0"/>
+              <a:t> even the </a:t>
+            </a:r>
+            <a:r>
+              <a:rPr lang="en-US" i="1" dirty="0" smtClean="0"/>
+              <a:t>__</a:t>
+            </a:r>
+            <a:r>
+              <a:rPr lang="en-US" i="1" dirty="0" err="1" smtClean="0"/>
+              <a:t>init</a:t>
+            </a:r>
+            <a:r>
+              <a:rPr lang="en-US" i="1" dirty="0" smtClean="0"/>
+              <a:t>__</a:t>
+            </a:r>
+            <a:r>
+              <a:rPr lang="en-US" dirty="0" smtClean="0"/>
+              <a:t> function. </a:t>
             </a:r>
             <a:endParaRPr lang="en-US" dirty="0"/>
           </a:p>
@@ -11123,7 +11128,7 @@
       </p:sp>
       <p:pic>
         <p:nvPicPr>
-          <p:cNvPr id="4" name="Picture 3"/>
+          <p:cNvPr id="5" name="Picture 4"/>
           <p:cNvPicPr>
             <a:picLocks noChangeAspect="1"/>
           </p:cNvPicPr>
@@ -11143,8 +11148,8 @@
         </p:blipFill>
         <p:spPr>
           <a:xfrm>
-            <a:off x="6323464" y="150125"/>
-            <a:ext cx="5701130" cy="6421272"/>
+            <a:off x="6409896" y="3803929"/>
+            <a:ext cx="2297375" cy="733884"/>
           </a:xfrm>
           <a:prstGeom prst="rect">
             <a:avLst/>
@@ -11154,7 +11159,7 @@
     </p:spTree>
     <p:extLst>
       <p:ext uri="{BB962C8B-B14F-4D97-AF65-F5344CB8AC3E}">
-        <p14:creationId xmlns:p14="http://schemas.microsoft.com/office/powerpoint/2010/main" val="574786461"/>
+        <p14:creationId xmlns:p14="http://schemas.microsoft.com/office/powerpoint/2010/main" val="469453324"/>
       </p:ext>
     </p:extLst>
   </p:cSld>
@@ -11295,56 +11300,13 @@
               <a:rPr lang="en-US" dirty="0" smtClean="0"/>
               <a:t>A satellite object also has a semi-major axis and an eccentricity. </a:t>
             </a:r>
-          </a:p>
-          <a:p>
-            <a:pPr marL="0" marR="0" lvl="0" indent="0" defTabSz="914400" eaLnBrk="1" fontAlgn="auto" latinLnBrk="0" hangingPunct="1">
-              <a:lnSpc>
-                <a:spcPct val="100000"/>
-              </a:lnSpc>
-              <a:spcBef>
-                <a:spcPts val="0"/>
-              </a:spcBef>
-              <a:spcAft>
-                <a:spcPts val="0"/>
-              </a:spcAft>
-              <a:buClrTx/>
-              <a:buSzTx/>
-              <a:buFontTx/>
-              <a:buNone/>
-              <a:tabLst/>
-              <a:defRPr/>
-            </a:pPr>
-            <a:endParaRPr lang="en-US" dirty="0"/>
-          </a:p>
-          <a:p>
-            <a:pPr marL="0" marR="0" lvl="0" indent="0" defTabSz="914400" eaLnBrk="1" fontAlgn="auto" latinLnBrk="0" hangingPunct="1">
-              <a:lnSpc>
-                <a:spcPct val="100000"/>
-              </a:lnSpc>
-              <a:spcBef>
-                <a:spcPts val="0"/>
-              </a:spcBef>
-              <a:spcAft>
-                <a:spcPts val="0"/>
-              </a:spcAft>
-              <a:buClrTx/>
-              <a:buSzTx/>
-              <a:buFontTx/>
-              <a:buNone/>
-              <a:tabLst/>
-              <a:defRPr/>
-            </a:pPr>
-            <a:r>
-              <a:rPr lang="en-US" dirty="0" smtClean="0"/>
-              <a:t>Planets, moons, asteroids, and comets don’t need any data beyond that. </a:t>
-            </a:r>
             <a:endParaRPr lang="en-US" dirty="0"/>
           </a:p>
         </p:txBody>
       </p:sp>
       <p:pic>
         <p:nvPicPr>
-          <p:cNvPr id="5" name="Picture 4"/>
+          <p:cNvPr id="4" name="Picture 3"/>
           <p:cNvPicPr>
             <a:picLocks noChangeAspect="1"/>
           </p:cNvPicPr>
@@ -11364,8 +11326,8 @@
         </p:blipFill>
         <p:spPr>
           <a:xfrm>
-            <a:off x="7186684" y="2708701"/>
-            <a:ext cx="2895600" cy="2641600"/>
+            <a:off x="6323464" y="150125"/>
+            <a:ext cx="5701130" cy="6421272"/>
           </a:xfrm>
           <a:prstGeom prst="rect">
             <a:avLst/>
@@ -11375,7 +11337,7 @@
     </p:spTree>
     <p:extLst>
       <p:ext uri="{BB962C8B-B14F-4D97-AF65-F5344CB8AC3E}">
-        <p14:creationId xmlns:p14="http://schemas.microsoft.com/office/powerpoint/2010/main" val="739908823"/>
+        <p14:creationId xmlns:p14="http://schemas.microsoft.com/office/powerpoint/2010/main" val="574786461"/>
       </p:ext>
     </p:extLst>
   </p:cSld>
@@ -11662,8 +11624,8 @@
         </p:nvSpPr>
         <p:spPr>
           <a:xfrm>
-            <a:off x="680322" y="2336873"/>
-            <a:ext cx="5065386" cy="3599316"/>
+            <a:off x="680321" y="2336873"/>
+            <a:ext cx="5229160" cy="3599316"/>
           </a:xfrm>
         </p:spPr>
         <p:txBody>
@@ -11689,15 +11651,7 @@
             </a:pPr>
             <a:r>
               <a:rPr lang="en-US" dirty="0" smtClean="0"/>
-              <a:t>Next: A planetary system composed of a planet object and moons. This requires no new syntax </a:t>
-            </a:r>
-            <a:r>
-              <a:rPr lang="mr-IN" dirty="0" smtClean="0"/>
-              <a:t>–</a:t>
-            </a:r>
-            <a:r>
-              <a:rPr lang="en-US" dirty="0" smtClean="0"/>
-              <a:t> these can be properties of a new class. </a:t>
+              <a:t>First pieces: the inheritance structure of the solar system bodies. All solar system bodies have a name and a mass. </a:t>
             </a:r>
           </a:p>
           <a:p>
@@ -11718,7 +11672,7 @@
               <a:tabLst/>
               <a:defRPr/>
             </a:pPr>
-            <a:endParaRPr lang="en-US" dirty="0" smtClean="0"/>
+            <a:endParaRPr lang="en-US" dirty="0"/>
           </a:p>
           <a:p>
             <a:pPr marL="0" marR="0" lvl="0" indent="0" defTabSz="914400" eaLnBrk="1" fontAlgn="auto" latinLnBrk="0" hangingPunct="1">
@@ -11738,7 +11692,10 @@
               <a:tabLst/>
               <a:defRPr/>
             </a:pPr>
-            <a:endParaRPr lang="en-US" dirty="0"/>
+            <a:r>
+              <a:rPr lang="en-US" dirty="0" smtClean="0"/>
+              <a:t>A satellite object also has a semi-major axis and an eccentricity. </a:t>
+            </a:r>
           </a:p>
           <a:p>
             <a:pPr marL="0" marR="0" lvl="0" indent="0" defTabSz="914400" eaLnBrk="1" fontAlgn="auto" latinLnBrk="0" hangingPunct="1">
@@ -11758,9 +11715,29 @@
               <a:tabLst/>
               <a:defRPr/>
             </a:pPr>
+            <a:endParaRPr lang="en-US" dirty="0"/>
+          </a:p>
+          <a:p>
+            <a:pPr marL="0" marR="0" lvl="0" indent="0" defTabSz="914400" eaLnBrk="1" fontAlgn="auto" latinLnBrk="0" hangingPunct="1">
+              <a:lnSpc>
+                <a:spcPct val="100000"/>
+              </a:lnSpc>
+              <a:spcBef>
+                <a:spcPts val="0"/>
+              </a:spcBef>
+              <a:spcAft>
+                <a:spcPts val="0"/>
+              </a:spcAft>
+              <a:buClrTx/>
+              <a:buSzTx/>
+              <a:buFontTx/>
+              <a:buNone/>
+              <a:tabLst/>
+              <a:defRPr/>
+            </a:pPr>
             <a:r>
               <a:rPr lang="en-US" dirty="0" smtClean="0"/>
-              <a:t>Here the planet attribute is just the planet object, and the moons is a list of moon objects. </a:t>
+              <a:t>Planets, moons, asteroids, and comets don’t need any data beyond that. </a:t>
             </a:r>
             <a:endParaRPr lang="en-US" dirty="0"/>
           </a:p>
@@ -11768,14 +11745,14 @@
       </p:sp>
       <p:pic>
         <p:nvPicPr>
-          <p:cNvPr id="6" name="Picture 5"/>
+          <p:cNvPr id="5" name="Picture 4"/>
           <p:cNvPicPr>
             <a:picLocks noChangeAspect="1"/>
           </p:cNvPicPr>
           <p:nvPr/>
         </p:nvPicPr>
         <p:blipFill>
-          <a:blip r:embed="rId2">
+          <a:blip r:embed="rId3">
             <a:extLst>
               <a:ext uri="{28A0092B-C50C-407E-A947-70E740481C1C}">
                 <a14:useLocalDpi xmlns:a14="http://schemas.microsoft.com/office/drawing/2010/main" val="0"/>
@@ -11788,8 +11765,8 @@
         </p:blipFill>
         <p:spPr>
           <a:xfrm>
-            <a:off x="6293250" y="616748"/>
-            <a:ext cx="5898750" cy="6104772"/>
+            <a:off x="7186684" y="2708701"/>
+            <a:ext cx="2895600" cy="2641600"/>
           </a:xfrm>
           <a:prstGeom prst="rect">
             <a:avLst/>
@@ -11799,7 +11776,7 @@
     </p:spTree>
     <p:extLst>
       <p:ext uri="{BB962C8B-B14F-4D97-AF65-F5344CB8AC3E}">
-        <p14:creationId xmlns:p14="http://schemas.microsoft.com/office/powerpoint/2010/main" val="365487806"/>
+        <p14:creationId xmlns:p14="http://schemas.microsoft.com/office/powerpoint/2010/main" val="739908823"/>
       </p:ext>
     </p:extLst>
   </p:cSld>
@@ -11869,7 +11846,7 @@
         <p:spPr>
           <a:xfrm>
             <a:off x="680322" y="2336873"/>
-            <a:ext cx="4328406" cy="3599316"/>
+            <a:ext cx="5065386" cy="3599316"/>
           </a:xfrm>
         </p:spPr>
         <p:txBody>
@@ -11895,7 +11872,15 @@
             </a:pPr>
             <a:r>
               <a:rPr lang="en-US" dirty="0" smtClean="0"/>
-              <a:t>Next: A solar system object composed of a star, planetary system objects, asteroids, and comets. </a:t>
+              <a:t>Next: A planetary system composed of a planet object and moons. This requires no new syntax </a:t>
+            </a:r>
+            <a:r>
+              <a:rPr lang="mr-IN" dirty="0" smtClean="0"/>
+              <a:t>–</a:t>
+            </a:r>
+            <a:r>
+              <a:rPr lang="en-US" dirty="0" smtClean="0"/>
+              <a:t> these can be properties of a new class. </a:t>
             </a:r>
           </a:p>
           <a:p>
@@ -11916,7 +11901,7 @@
               <a:tabLst/>
               <a:defRPr/>
             </a:pPr>
-            <a:endParaRPr lang="en-US" dirty="0"/>
+            <a:endParaRPr lang="en-US" dirty="0" smtClean="0"/>
           </a:p>
           <a:p>
             <a:pPr marL="0" marR="0" lvl="0" indent="0" defTabSz="914400" eaLnBrk="1" fontAlgn="auto" latinLnBrk="0" hangingPunct="1">
@@ -11936,25 +11921,29 @@
               <a:tabLst/>
               <a:defRPr/>
             </a:pPr>
+            <a:endParaRPr lang="en-US" dirty="0"/>
+          </a:p>
+          <a:p>
+            <a:pPr marL="0" marR="0" lvl="0" indent="0" defTabSz="914400" eaLnBrk="1" fontAlgn="auto" latinLnBrk="0" hangingPunct="1">
+              <a:lnSpc>
+                <a:spcPct val="100000"/>
+              </a:lnSpc>
+              <a:spcBef>
+                <a:spcPts val="0"/>
+              </a:spcBef>
+              <a:spcAft>
+                <a:spcPts val="0"/>
+              </a:spcAft>
+              <a:buClrTx/>
+              <a:buSzTx/>
+              <a:buFontTx/>
+              <a:buNone/>
+              <a:tabLst/>
+              <a:defRPr/>
+            </a:pPr>
             <a:r>
               <a:rPr lang="en-US" dirty="0" smtClean="0"/>
-              <a:t>Note: the </a:t>
-            </a:r>
-            <a:r>
-              <a:rPr lang="en-US" i="1" dirty="0" smtClean="0"/>
-              <a:t>__</a:t>
-            </a:r>
-            <a:r>
-              <a:rPr lang="en-US" i="1" dirty="0" err="1" smtClean="0"/>
-              <a:t>init</a:t>
-            </a:r>
-            <a:r>
-              <a:rPr lang="en-US" i="1" dirty="0" smtClean="0"/>
-              <a:t>__ </a:t>
-            </a:r>
-            <a:r>
-              <a:rPr lang="en-US" dirty="0" smtClean="0"/>
-              <a:t>function is calling setter functions not pictured here. </a:t>
+              <a:t>Here the planet attribute is just the planet object, and the moons is a list of moon objects. </a:t>
             </a:r>
             <a:endParaRPr lang="en-US" dirty="0"/>
           </a:p>
@@ -11962,7 +11951,7 @@
       </p:sp>
       <p:pic>
         <p:nvPicPr>
-          <p:cNvPr id="4" name="Picture 3"/>
+          <p:cNvPr id="6" name="Picture 5"/>
           <p:cNvPicPr>
             <a:picLocks noChangeAspect="1"/>
           </p:cNvPicPr>
@@ -11982,8 +11971,8 @@
         </p:blipFill>
         <p:spPr>
           <a:xfrm>
-            <a:off x="5169848" y="2336873"/>
-            <a:ext cx="6751163" cy="3859473"/>
+            <a:off x="6293250" y="616748"/>
+            <a:ext cx="5898750" cy="6104772"/>
           </a:xfrm>
           <a:prstGeom prst="rect">
             <a:avLst/>
@@ -11993,7 +11982,7 @@
     </p:spTree>
     <p:extLst>
       <p:ext uri="{BB962C8B-B14F-4D97-AF65-F5344CB8AC3E}">
-        <p14:creationId xmlns:p14="http://schemas.microsoft.com/office/powerpoint/2010/main" val="1624147783"/>
+        <p14:creationId xmlns:p14="http://schemas.microsoft.com/office/powerpoint/2010/main" val="365487806"/>
       </p:ext>
     </p:extLst>
   </p:cSld>
@@ -12132,70 +12121,31 @@
             </a:pPr>
             <a:r>
               <a:rPr lang="en-US" dirty="0" smtClean="0"/>
-              <a:t>The </a:t>
+              <a:t>Note: the </a:t>
             </a:r>
             <a:r>
               <a:rPr lang="en-US" i="1" dirty="0" smtClean="0"/>
-              <a:t>planets</a:t>
+              <a:t>__</a:t>
+            </a:r>
+            <a:r>
+              <a:rPr lang="en-US" i="1" dirty="0" err="1" smtClean="0"/>
+              <a:t>init</a:t>
+            </a:r>
+            <a:r>
+              <a:rPr lang="en-US" i="1" dirty="0" smtClean="0"/>
+              <a:t>__ </a:t>
             </a:r>
             <a:r>
               <a:rPr lang="en-US" dirty="0" smtClean="0"/>
-              <a:t> attribute is a list of </a:t>
-            </a:r>
-            <a:r>
-              <a:rPr lang="en-US" i="1" dirty="0" err="1" smtClean="0"/>
-              <a:t>planetary_system</a:t>
-            </a:r>
-            <a:r>
-              <a:rPr lang="en-US" dirty="0" smtClean="0"/>
-              <a:t> objects. The </a:t>
-            </a:r>
-            <a:r>
-              <a:rPr lang="en-US" i="1" dirty="0" smtClean="0"/>
-              <a:t>asteroids</a:t>
-            </a:r>
-            <a:r>
-              <a:rPr lang="en-US" dirty="0"/>
-              <a:t> </a:t>
-            </a:r>
-            <a:r>
-              <a:rPr lang="en-US" dirty="0" smtClean="0"/>
-              <a:t>and </a:t>
-            </a:r>
-            <a:r>
-              <a:rPr lang="en-US" i="1" dirty="0" smtClean="0"/>
-              <a:t>comets</a:t>
-            </a:r>
-            <a:r>
-              <a:rPr lang="en-US" dirty="0" smtClean="0"/>
-              <a:t> properties proceed similarly. </a:t>
-            </a:r>
-          </a:p>
-          <a:p>
-            <a:pPr marL="0" marR="0" lvl="0" indent="0" defTabSz="914400" eaLnBrk="1" fontAlgn="auto" latinLnBrk="0" hangingPunct="1">
-              <a:lnSpc>
-                <a:spcPct val="100000"/>
-              </a:lnSpc>
-              <a:spcBef>
-                <a:spcPts val="0"/>
-              </a:spcBef>
-              <a:spcAft>
-                <a:spcPts val="0"/>
-              </a:spcAft>
-              <a:buClrTx/>
-              <a:buSzTx/>
-              <a:buFontTx/>
-              <a:buNone/>
-              <a:tabLst/>
-              <a:defRPr/>
-            </a:pPr>
+              <a:t>function is calling setter functions not pictured here. </a:t>
+            </a:r>
             <a:endParaRPr lang="en-US" dirty="0"/>
           </a:p>
         </p:txBody>
       </p:sp>
       <p:pic>
         <p:nvPicPr>
-          <p:cNvPr id="5" name="Picture 4"/>
+          <p:cNvPr id="4" name="Picture 3"/>
           <p:cNvPicPr>
             <a:picLocks noChangeAspect="1"/>
           </p:cNvPicPr>
@@ -12215,8 +12165,8 @@
         </p:blipFill>
         <p:spPr>
           <a:xfrm>
-            <a:off x="5194300" y="2601451"/>
-            <a:ext cx="6751997" cy="3070159"/>
+            <a:off x="5169848" y="2336873"/>
+            <a:ext cx="6751163" cy="3859473"/>
           </a:xfrm>
           <a:prstGeom prst="rect">
             <a:avLst/>
@@ -12226,7 +12176,7 @@
     </p:spTree>
     <p:extLst>
       <p:ext uri="{BB962C8B-B14F-4D97-AF65-F5344CB8AC3E}">
-        <p14:creationId xmlns:p14="http://schemas.microsoft.com/office/powerpoint/2010/main" val="746160780"/>
+        <p14:creationId xmlns:p14="http://schemas.microsoft.com/office/powerpoint/2010/main" val="1624147783"/>
       </p:ext>
     </p:extLst>
   </p:cSld>
@@ -12322,6 +12272,239 @@
             </a:pPr>
             <a:r>
               <a:rPr lang="en-US" dirty="0" smtClean="0"/>
+              <a:t>Next: A solar system object composed of a star, planetary system objects, asteroids, and comets. </a:t>
+            </a:r>
+          </a:p>
+          <a:p>
+            <a:pPr marL="0" marR="0" lvl="0" indent="0" defTabSz="914400" eaLnBrk="1" fontAlgn="auto" latinLnBrk="0" hangingPunct="1">
+              <a:lnSpc>
+                <a:spcPct val="100000"/>
+              </a:lnSpc>
+              <a:spcBef>
+                <a:spcPts val="0"/>
+              </a:spcBef>
+              <a:spcAft>
+                <a:spcPts val="0"/>
+              </a:spcAft>
+              <a:buClrTx/>
+              <a:buSzTx/>
+              <a:buFontTx/>
+              <a:buNone/>
+              <a:tabLst/>
+              <a:defRPr/>
+            </a:pPr>
+            <a:endParaRPr lang="en-US" dirty="0"/>
+          </a:p>
+          <a:p>
+            <a:pPr marL="0" marR="0" lvl="0" indent="0" defTabSz="914400" eaLnBrk="1" fontAlgn="auto" latinLnBrk="0" hangingPunct="1">
+              <a:lnSpc>
+                <a:spcPct val="100000"/>
+              </a:lnSpc>
+              <a:spcBef>
+                <a:spcPts val="0"/>
+              </a:spcBef>
+              <a:spcAft>
+                <a:spcPts val="0"/>
+              </a:spcAft>
+              <a:buClrTx/>
+              <a:buSzTx/>
+              <a:buFontTx/>
+              <a:buNone/>
+              <a:tabLst/>
+              <a:defRPr/>
+            </a:pPr>
+            <a:r>
+              <a:rPr lang="en-US" dirty="0" smtClean="0"/>
+              <a:t>The </a:t>
+            </a:r>
+            <a:r>
+              <a:rPr lang="en-US" i="1" dirty="0" smtClean="0"/>
+              <a:t>planets</a:t>
+            </a:r>
+            <a:r>
+              <a:rPr lang="en-US" dirty="0" smtClean="0"/>
+              <a:t> attribute is a list of </a:t>
+            </a:r>
+            <a:r>
+              <a:rPr lang="en-US" i="1" dirty="0" err="1" smtClean="0"/>
+              <a:t>planetary_system</a:t>
+            </a:r>
+            <a:r>
+              <a:rPr lang="en-US" dirty="0" smtClean="0"/>
+              <a:t> objects. The </a:t>
+            </a:r>
+            <a:r>
+              <a:rPr lang="en-US" i="1" dirty="0" smtClean="0"/>
+              <a:t>asteroids</a:t>
+            </a:r>
+            <a:r>
+              <a:rPr lang="en-US" dirty="0"/>
+              <a:t> </a:t>
+            </a:r>
+            <a:r>
+              <a:rPr lang="en-US" dirty="0" smtClean="0"/>
+              <a:t>and </a:t>
+            </a:r>
+            <a:r>
+              <a:rPr lang="en-US" i="1" dirty="0" smtClean="0"/>
+              <a:t>comets</a:t>
+            </a:r>
+            <a:r>
+              <a:rPr lang="en-US" dirty="0" smtClean="0"/>
+              <a:t> properties proceed similarly. </a:t>
+            </a:r>
+          </a:p>
+          <a:p>
+            <a:pPr marL="0" marR="0" lvl="0" indent="0" defTabSz="914400" eaLnBrk="1" fontAlgn="auto" latinLnBrk="0" hangingPunct="1">
+              <a:lnSpc>
+                <a:spcPct val="100000"/>
+              </a:lnSpc>
+              <a:spcBef>
+                <a:spcPts val="0"/>
+              </a:spcBef>
+              <a:spcAft>
+                <a:spcPts val="0"/>
+              </a:spcAft>
+              <a:buClrTx/>
+              <a:buSzTx/>
+              <a:buFontTx/>
+              <a:buNone/>
+              <a:tabLst/>
+              <a:defRPr/>
+            </a:pPr>
+            <a:endParaRPr lang="en-US" dirty="0"/>
+          </a:p>
+        </p:txBody>
+      </p:sp>
+      <p:pic>
+        <p:nvPicPr>
+          <p:cNvPr id="5" name="Picture 4"/>
+          <p:cNvPicPr>
+            <a:picLocks noChangeAspect="1"/>
+          </p:cNvPicPr>
+          <p:nvPr/>
+        </p:nvPicPr>
+        <p:blipFill>
+          <a:blip r:embed="rId2">
+            <a:extLst>
+              <a:ext uri="{28A0092B-C50C-407E-A947-70E740481C1C}">
+                <a14:useLocalDpi xmlns:a14="http://schemas.microsoft.com/office/drawing/2010/main" val="0"/>
+              </a:ext>
+            </a:extLst>
+          </a:blip>
+          <a:stretch>
+            <a:fillRect/>
+          </a:stretch>
+        </p:blipFill>
+        <p:spPr>
+          <a:xfrm>
+            <a:off x="5194300" y="2601451"/>
+            <a:ext cx="6751997" cy="3070159"/>
+          </a:xfrm>
+          <a:prstGeom prst="rect">
+            <a:avLst/>
+          </a:prstGeom>
+        </p:spPr>
+      </p:pic>
+    </p:spTree>
+    <p:extLst>
+      <p:ext uri="{BB962C8B-B14F-4D97-AF65-F5344CB8AC3E}">
+        <p14:creationId xmlns:p14="http://schemas.microsoft.com/office/powerpoint/2010/main" val="746160780"/>
+      </p:ext>
+    </p:extLst>
+  </p:cSld>
+  <p:clrMapOvr>
+    <a:masterClrMapping/>
+  </p:clrMapOvr>
+  <p:timing>
+    <p:tnLst>
+      <p:par>
+        <p:cTn id="1" dur="indefinite" restart="never" nodeType="tmRoot"/>
+      </p:par>
+    </p:tnLst>
+  </p:timing>
+</p:sld>
+</file>
+
+<file path=ppt/slides/slide24.xml><?xml version="1.0" encoding="utf-8"?>
+<p:sld xmlns:a="http://schemas.openxmlformats.org/drawingml/2006/main" xmlns:r="http://schemas.openxmlformats.org/officeDocument/2006/relationships" xmlns:p="http://schemas.openxmlformats.org/presentationml/2006/main">
+  <p:cSld>
+    <p:spTree>
+      <p:nvGrpSpPr>
+        <p:cNvPr id="1" name=""/>
+        <p:cNvGrpSpPr/>
+        <p:nvPr/>
+      </p:nvGrpSpPr>
+      <p:grpSpPr>
+        <a:xfrm>
+          <a:off x="0" y="0"/>
+          <a:ext cx="0" cy="0"/>
+          <a:chOff x="0" y="0"/>
+          <a:chExt cx="0" cy="0"/>
+        </a:xfrm>
+      </p:grpSpPr>
+      <p:sp>
+        <p:nvSpPr>
+          <p:cNvPr id="2" name="Title 1"/>
+          <p:cNvSpPr>
+            <a:spLocks noGrp="1"/>
+          </p:cNvSpPr>
+          <p:nvPr>
+            <p:ph type="title"/>
+          </p:nvPr>
+        </p:nvSpPr>
+        <p:spPr/>
+        <p:txBody>
+          <a:bodyPr/>
+          <a:lstStyle/>
+          <a:p>
+            <a:r>
+              <a:rPr lang="en-US" dirty="0" smtClean="0"/>
+              <a:t>Composition: A Solar System </a:t>
+            </a:r>
+            <a:endParaRPr lang="en-US" dirty="0"/>
+          </a:p>
+        </p:txBody>
+      </p:sp>
+      <p:sp>
+        <p:nvSpPr>
+          <p:cNvPr id="3" name="Content Placeholder 2"/>
+          <p:cNvSpPr>
+            <a:spLocks noGrp="1"/>
+          </p:cNvSpPr>
+          <p:nvPr>
+            <p:ph idx="1"/>
+          </p:nvPr>
+        </p:nvSpPr>
+        <p:spPr>
+          <a:xfrm>
+            <a:off x="680322" y="2336873"/>
+            <a:ext cx="4328406" cy="3599316"/>
+          </a:xfrm>
+        </p:spPr>
+        <p:txBody>
+          <a:bodyPr/>
+          <a:lstStyle/>
+          <a:p>
+            <a:pPr marL="0" marR="0" lvl="0" indent="0" defTabSz="914400" eaLnBrk="1" fontAlgn="auto" latinLnBrk="0" hangingPunct="1">
+              <a:lnSpc>
+                <a:spcPct val="100000"/>
+              </a:lnSpc>
+              <a:spcBef>
+                <a:spcPts val="0"/>
+              </a:spcBef>
+              <a:spcAft>
+                <a:spcPts val="0"/>
+              </a:spcAft>
+              <a:buClrTx/>
+              <a:buSzTx/>
+              <a:buFontTx/>
+              <a:buNone/>
+              <a:tabLst/>
+              <a:defRPr/>
+            </a:pPr>
+            <a:r>
+              <a:rPr lang="en-US" dirty="0" smtClean="0"/>
               <a:t>The </a:t>
             </a:r>
             <a:r>
@@ -12423,7 +12606,7 @@
 </p:sld>
 </file>
 
-<file path=ppt/slides/slide24.xml><?xml version="1.0" encoding="utf-8"?>
+<file path=ppt/slides/slide25.xml><?xml version="1.0" encoding="utf-8"?>
 <p:sld xmlns:a="http://schemas.openxmlformats.org/drawingml/2006/main" xmlns:r="http://schemas.openxmlformats.org/officeDocument/2006/relationships" xmlns:p="http://schemas.openxmlformats.org/presentationml/2006/main">
   <p:cSld>
     <p:spTree>
@@ -13702,8 +13885,13 @@
             </a:r>
             <a:r>
               <a:rPr lang="en-US" dirty="0" smtClean="0"/>
-              <a:t> storing the data any person would have, like their name, height, age, gender, etc. </a:t>
-            </a:r>
+              <a:t> storing the data any person would </a:t>
+            </a:r>
+            <a:r>
+              <a:rPr lang="en-US" dirty="0" smtClean="0"/>
+              <a:t>have (e.g. their name). </a:t>
+            </a:r>
+            <a:endParaRPr lang="en-US" dirty="0" smtClean="0"/>
           </a:p>
           <a:p>
             <a:pPr marL="0" indent="0">

</xml_diff>

<commit_message>
slides, exercises: minor updates to inheritance and composition material
</commit_message>
<xml_diff>
--- a/slides/inheritance_composition.pptx
+++ b/slides/inheritance_composition.pptx
@@ -223,7 +223,7 @@
           <a:p>
             <a:fld id="{C24E9693-3B1A-6144-852A-5B7733F5E2A6}" type="datetimeFigureOut">
               <a:rPr lang="en-US" smtClean="0"/>
-              <a:t>5/18/21</a:t>
+              <a:t>5/19/21</a:t>
             </a:fld>
             <a:endParaRPr lang="en-US"/>
           </a:p>
@@ -1647,7 +1647,7 @@
           <a:p>
             <a:fld id="{51673806-0BCD-1F42-BAA8-2011034B3C6A}" type="datetimeFigureOut">
               <a:rPr lang="en-US" smtClean="0"/>
-              <a:t>5/18/21</a:t>
+              <a:t>5/19/21</a:t>
             </a:fld>
             <a:endParaRPr lang="en-US"/>
           </a:p>
@@ -2061,7 +2061,7 @@
           <a:p>
             <a:fld id="{51673806-0BCD-1F42-BAA8-2011034B3C6A}" type="datetimeFigureOut">
               <a:rPr lang="en-US" smtClean="0"/>
-              <a:t>5/18/21</a:t>
+              <a:t>5/19/21</a:t>
             </a:fld>
             <a:endParaRPr lang="en-US"/>
           </a:p>
@@ -2392,7 +2392,7 @@
           <a:p>
             <a:fld id="{51673806-0BCD-1F42-BAA8-2011034B3C6A}" type="datetimeFigureOut">
               <a:rPr lang="en-US" smtClean="0"/>
-              <a:t>5/18/21</a:t>
+              <a:t>5/19/21</a:t>
             </a:fld>
             <a:endParaRPr lang="en-US"/>
           </a:p>
@@ -2792,7 +2792,7 @@
           <a:p>
             <a:fld id="{51673806-0BCD-1F42-BAA8-2011034B3C6A}" type="datetimeFigureOut">
               <a:rPr lang="en-US" smtClean="0"/>
-              <a:t>5/18/21</a:t>
+              <a:t>5/19/21</a:t>
             </a:fld>
             <a:endParaRPr lang="en-US"/>
           </a:p>
@@ -3355,7 +3355,7 @@
           <a:p>
             <a:fld id="{51673806-0BCD-1F42-BAA8-2011034B3C6A}" type="datetimeFigureOut">
               <a:rPr lang="en-US" smtClean="0"/>
-              <a:t>5/18/21</a:t>
+              <a:t>5/19/21</a:t>
             </a:fld>
             <a:endParaRPr lang="en-US"/>
           </a:p>
@@ -4031,7 +4031,7 @@
           <a:p>
             <a:fld id="{51673806-0BCD-1F42-BAA8-2011034B3C6A}" type="datetimeFigureOut">
               <a:rPr lang="en-US" smtClean="0"/>
-              <a:t>5/18/21</a:t>
+              <a:t>5/19/21</a:t>
             </a:fld>
             <a:endParaRPr lang="en-US"/>
           </a:p>
@@ -4939,7 +4939,7 @@
           <a:p>
             <a:fld id="{51673806-0BCD-1F42-BAA8-2011034B3C6A}" type="datetimeFigureOut">
               <a:rPr lang="en-US" smtClean="0"/>
-              <a:t>5/18/21</a:t>
+              <a:t>5/19/21</a:t>
             </a:fld>
             <a:endParaRPr lang="en-US"/>
           </a:p>
@@ -5247,7 +5247,7 @@
           <a:p>
             <a:fld id="{51673806-0BCD-1F42-BAA8-2011034B3C6A}" type="datetimeFigureOut">
               <a:rPr lang="en-US" smtClean="0"/>
-              <a:t>5/18/21</a:t>
+              <a:t>5/19/21</a:t>
             </a:fld>
             <a:endParaRPr lang="en-US"/>
           </a:p>
@@ -5506,7 +5506,7 @@
           <a:p>
             <a:fld id="{51673806-0BCD-1F42-BAA8-2011034B3C6A}" type="datetimeFigureOut">
               <a:rPr lang="en-US" smtClean="0"/>
-              <a:t>5/18/21</a:t>
+              <a:t>5/19/21</a:t>
             </a:fld>
             <a:endParaRPr lang="en-US"/>
           </a:p>
@@ -5829,7 +5829,7 @@
           <a:p>
             <a:fld id="{51673806-0BCD-1F42-BAA8-2011034B3C6A}" type="datetimeFigureOut">
               <a:rPr lang="en-US" smtClean="0"/>
-              <a:t>5/18/21</a:t>
+              <a:t>5/19/21</a:t>
             </a:fld>
             <a:endParaRPr lang="en-US"/>
           </a:p>
@@ -6213,7 +6213,7 @@
           <a:p>
             <a:fld id="{51673806-0BCD-1F42-BAA8-2011034B3C6A}" type="datetimeFigureOut">
               <a:rPr lang="en-US" smtClean="0"/>
-              <a:t>5/18/21</a:t>
+              <a:t>5/19/21</a:t>
             </a:fld>
             <a:endParaRPr lang="en-US"/>
           </a:p>
@@ -6589,7 +6589,7 @@
           <a:p>
             <a:fld id="{51673806-0BCD-1F42-BAA8-2011034B3C6A}" type="datetimeFigureOut">
               <a:rPr lang="en-US" smtClean="0"/>
-              <a:t>5/18/21</a:t>
+              <a:t>5/19/21</a:t>
             </a:fld>
             <a:endParaRPr lang="en-US"/>
           </a:p>
@@ -7095,7 +7095,7 @@
           <a:p>
             <a:fld id="{51673806-0BCD-1F42-BAA8-2011034B3C6A}" type="datetimeFigureOut">
               <a:rPr lang="en-US" smtClean="0"/>
-              <a:t>5/18/21</a:t>
+              <a:t>5/19/21</a:t>
             </a:fld>
             <a:endParaRPr lang="en-US"/>
           </a:p>
@@ -7352,7 +7352,7 @@
           <a:p>
             <a:fld id="{51673806-0BCD-1F42-BAA8-2011034B3C6A}" type="datetimeFigureOut">
               <a:rPr lang="en-US" smtClean="0"/>
-              <a:t>5/18/21</a:t>
+              <a:t>5/19/21</a:t>
             </a:fld>
             <a:endParaRPr lang="en-US"/>
           </a:p>
@@ -7510,7 +7510,7 @@
           <a:p>
             <a:fld id="{51673806-0BCD-1F42-BAA8-2011034B3C6A}" type="datetimeFigureOut">
               <a:rPr lang="en-US" smtClean="0"/>
-              <a:t>5/18/21</a:t>
+              <a:t>5/19/21</a:t>
             </a:fld>
             <a:endParaRPr lang="en-US"/>
           </a:p>
@@ -7900,7 +7900,7 @@
           <a:p>
             <a:fld id="{51673806-0BCD-1F42-BAA8-2011034B3C6A}" type="datetimeFigureOut">
               <a:rPr lang="en-US" smtClean="0"/>
-              <a:t>5/18/21</a:t>
+              <a:t>5/19/21</a:t>
             </a:fld>
             <a:endParaRPr lang="en-US"/>
           </a:p>
@@ -8309,7 +8309,7 @@
           <a:p>
             <a:fld id="{51673806-0BCD-1F42-BAA8-2011034B3C6A}" type="datetimeFigureOut">
               <a:rPr lang="en-US" smtClean="0"/>
-              <a:t>5/18/21</a:t>
+              <a:t>5/19/21</a:t>
             </a:fld>
             <a:endParaRPr lang="en-US"/>
           </a:p>
@@ -8555,7 +8555,7 @@
             <a:fld id="{51673806-0BCD-1F42-BAA8-2011034B3C6A}" type="datetimeFigureOut">
               <a:rPr lang="en-US" smtClean="0"/>
               <a:pPr/>
-              <a:t>5/18/21</a:t>
+              <a:t>5/19/21</a:t>
             </a:fld>
             <a:endParaRPr lang="en-US" dirty="0"/>
           </a:p>
@@ -10246,10 +10246,10 @@
       </p:sp>
       <p:pic>
         <p:nvPicPr>
-          <p:cNvPr id="5" name="Picture 4">
+          <p:cNvPr id="8" name="Picture 7">
             <a:extLst>
               <a:ext uri="{FF2B5EF4-FFF2-40B4-BE49-F238E27FC236}">
-                <a16:creationId xmlns:a16="http://schemas.microsoft.com/office/drawing/2014/main" id="{80D6EC6A-49B8-A44F-BBA0-3BDE1080A256}"/>
+                <a16:creationId xmlns:a16="http://schemas.microsoft.com/office/drawing/2014/main" id="{EE787CBC-5721-3D48-A86B-B56DA4EC0E66}"/>
               </a:ext>
             </a:extLst>
           </p:cNvPr>
@@ -10266,8 +10266,8 @@
         </p:blipFill>
         <p:spPr>
           <a:xfrm>
-            <a:off x="6073253" y="2047106"/>
-            <a:ext cx="5905500" cy="4711700"/>
+            <a:off x="5649047" y="2255067"/>
+            <a:ext cx="6542953" cy="4377744"/>
           </a:xfrm>
           <a:prstGeom prst="rect">
             <a:avLst/>
@@ -10543,10 +10543,10 @@
       </p:sp>
       <p:pic>
         <p:nvPicPr>
-          <p:cNvPr id="6" name="Picture 5">
+          <p:cNvPr id="5" name="Picture 4">
             <a:extLst>
               <a:ext uri="{FF2B5EF4-FFF2-40B4-BE49-F238E27FC236}">
-                <a16:creationId xmlns:a16="http://schemas.microsoft.com/office/drawing/2014/main" id="{30DAC113-D2E8-AA4C-9090-23C43DB43A2C}"/>
+                <a16:creationId xmlns:a16="http://schemas.microsoft.com/office/drawing/2014/main" id="{6561EE19-9FA9-5746-8017-054747855673}"/>
               </a:ext>
             </a:extLst>
           </p:cNvPr>
@@ -10563,8 +10563,8 @@
         </p:blipFill>
         <p:spPr>
           <a:xfrm>
-            <a:off x="5893842" y="2112908"/>
-            <a:ext cx="6088892" cy="4615911"/>
+            <a:off x="5747667" y="2019870"/>
+            <a:ext cx="6330896" cy="4783540"/>
           </a:xfrm>
           <a:prstGeom prst="rect">
             <a:avLst/>

</xml_diff>

<commit_message>
slides: minor edits for session 4
</commit_message>
<xml_diff>
--- a/slides/inheritance_composition.pptx
+++ b/slides/inheritance_composition.pptx
@@ -22,7 +22,7 @@
     <p:sldId id="280" r:id="rId13"/>
     <p:sldId id="277" r:id="rId14"/>
     <p:sldId id="281" r:id="rId15"/>
-    <p:sldId id="282" r:id="rId16"/>
+    <p:sldId id="283" r:id="rId16"/>
     <p:sldId id="278" r:id="rId17"/>
     <p:sldId id="267" r:id="rId18"/>
     <p:sldId id="268" r:id="rId19"/>
@@ -534,18 +534,6 @@
           <a:bodyPr/>
           <a:lstStyle/>
           <a:p>
-            <a:r>
-              <a:rPr lang="en-US" dirty="0"/>
-              <a:t>In case anyone hasn’t seen it yet, </a:t>
-            </a:r>
-            <a:r>
-              <a:rPr lang="en-US" i="1" dirty="0"/>
-              <a:t>del</a:t>
-            </a:r>
-            <a:r>
-              <a:rPr lang="en-US" i="0" dirty="0"/>
-              <a:t> is a keyword which means delete. </a:t>
-            </a:r>
             <a:endParaRPr lang="en-US" dirty="0"/>
           </a:p>
         </p:txBody>
@@ -567,7 +555,7 @@
           <a:p>
             <a:fld id="{BDAAE321-3917-0140-B87E-FBAD3B4B5EF6}" type="slidenum">
               <a:rPr lang="en-US" smtClean="0"/>
-              <a:t>11</a:t>
+              <a:t>10</a:t>
             </a:fld>
             <a:endParaRPr lang="en-US"/>
           </a:p>
@@ -576,7 +564,7 @@
     </p:spTree>
     <p:extLst>
       <p:ext uri="{BB962C8B-B14F-4D97-AF65-F5344CB8AC3E}">
-        <p14:creationId xmlns:p14="http://schemas.microsoft.com/office/powerpoint/2010/main" val="2418599241"/>
+        <p14:creationId xmlns:p14="http://schemas.microsoft.com/office/powerpoint/2010/main" val="3192238249"/>
       </p:ext>
     </p:extLst>
   </p:cSld>
@@ -632,43 +620,15 @@
           <a:p>
             <a:r>
               <a:rPr lang="en-US" dirty="0"/>
-              <a:t>Say verbally</a:t>
-            </a:r>
-            <a:r>
-              <a:rPr lang="en-US" baseline="0" dirty="0"/>
-              <a:t> that you can do this simply because even the __</a:t>
-            </a:r>
-            <a:r>
-              <a:rPr lang="en-US" baseline="0" dirty="0" err="1"/>
-              <a:t>init</a:t>
-            </a:r>
-            <a:r>
-              <a:rPr lang="en-US" baseline="0" dirty="0"/>
-              <a:t>__ function can be inherited. If you’re just going to “</a:t>
-            </a:r>
-            <a:r>
-              <a:rPr lang="en-US" baseline="0" dirty="0" err="1"/>
-              <a:t>def</a:t>
-            </a:r>
-            <a:r>
-              <a:rPr lang="en-US" baseline="0" dirty="0"/>
-              <a:t> __</a:t>
-            </a:r>
-            <a:r>
-              <a:rPr lang="en-US" baseline="0" dirty="0" err="1"/>
-              <a:t>init</a:t>
-            </a:r>
-            <a:r>
-              <a:rPr lang="en-US" baseline="0" dirty="0"/>
-              <a:t>__(self): super().__</a:t>
-            </a:r>
-            <a:r>
-              <a:rPr lang="en-US" baseline="0" dirty="0" err="1"/>
-              <a:t>init</a:t>
-            </a:r>
-            <a:r>
-              <a:rPr lang="en-US" baseline="0" dirty="0"/>
-              <a:t>__()” then you don’t even need to write that. </a:t>
+              <a:t>In case anyone hasn’t seen it yet, </a:t>
+            </a:r>
+            <a:r>
+              <a:rPr lang="en-US" i="1" dirty="0"/>
+              <a:t>del</a:t>
+            </a:r>
+            <a:r>
+              <a:rPr lang="en-US" i="0" dirty="0"/>
+              <a:t> is a keyword which means delete. </a:t>
             </a:r>
             <a:endParaRPr lang="en-US" dirty="0"/>
           </a:p>
@@ -681,7 +641,7 @@
             <a:spLocks noGrp="1"/>
           </p:cNvSpPr>
           <p:nvPr>
-            <p:ph type="sldNum" sz="quarter" idx="10"/>
+            <p:ph type="sldNum" sz="quarter" idx="5"/>
           </p:nvPr>
         </p:nvSpPr>
         <p:spPr/>
@@ -691,7 +651,7 @@
           <a:p>
             <a:fld id="{BDAAE321-3917-0140-B87E-FBAD3B4B5EF6}" type="slidenum">
               <a:rPr lang="en-US" smtClean="0"/>
-              <a:t>13</a:t>
+              <a:t>11</a:t>
             </a:fld>
             <a:endParaRPr lang="en-US"/>
           </a:p>
@@ -700,7 +660,7 @@
     </p:spTree>
     <p:extLst>
       <p:ext uri="{BB962C8B-B14F-4D97-AF65-F5344CB8AC3E}">
-        <p14:creationId xmlns:p14="http://schemas.microsoft.com/office/powerpoint/2010/main" val="502024618"/>
+        <p14:creationId xmlns:p14="http://schemas.microsoft.com/office/powerpoint/2010/main" val="2418599241"/>
       </p:ext>
     </p:extLst>
   </p:cSld>
@@ -756,62 +716,43 @@
           <a:p>
             <a:r>
               <a:rPr lang="en-US" dirty="0"/>
-              <a:t>Note verbally here that “</a:t>
-            </a:r>
-            <a:r>
-              <a:rPr lang="en-US" dirty="0" err="1"/>
-              <a:t>self.__class</a:t>
-            </a:r>
-            <a:r>
-              <a:rPr lang="en-US" dirty="0"/>
-              <a:t>__” is the same as saying “positive(…)” – it’s a way of invoking the class without having to type its actual name (what if the name changed?). This class is in the git repository under examples/classes/</a:t>
-            </a:r>
-            <a:r>
-              <a:rPr lang="en-US" dirty="0" err="1"/>
-              <a:t>positive.py</a:t>
-            </a:r>
-            <a:r>
-              <a:rPr lang="en-US" dirty="0"/>
-              <a:t>. </a:t>
-            </a:r>
-          </a:p>
-          <a:p>
-            <a:pPr marL="0" marR="0" lvl="0" indent="0" algn="l" defTabSz="914400" rtl="0" eaLnBrk="1" fontAlgn="auto" latinLnBrk="0" hangingPunct="1">
-              <a:lnSpc>
-                <a:spcPct val="100000"/>
-              </a:lnSpc>
-              <a:spcBef>
-                <a:spcPts val="0"/>
-              </a:spcBef>
-              <a:spcAft>
-                <a:spcPts val="0"/>
-              </a:spcAft>
-              <a:buClrTx/>
-              <a:buSzTx/>
-              <a:buFontTx/>
-              <a:buNone/>
-              <a:tabLst/>
-              <a:defRPr/>
-            </a:pPr>
-            <a:r>
-              <a:rPr lang="en-US" dirty="0"/>
-              <a:t>A good example of </a:t>
-            </a:r>
-            <a:r>
-              <a:rPr lang="en-US" i="1" dirty="0"/>
-              <a:t>__new__</a:t>
-            </a:r>
-            <a:r>
-              <a:rPr lang="en-US" i="0" dirty="0"/>
-              <a:t> returning a different class is the multizone object in VICE returning a </a:t>
-            </a:r>
-            <a:r>
-              <a:rPr lang="en-US" i="0" dirty="0" err="1"/>
-              <a:t>singlezone</a:t>
-            </a:r>
-            <a:r>
-              <a:rPr lang="en-US" i="0" dirty="0"/>
-              <a:t> object when the number of zones is equal to one. </a:t>
+              <a:t>Say verbally</a:t>
+            </a:r>
+            <a:r>
+              <a:rPr lang="en-US" baseline="0" dirty="0"/>
+              <a:t> that you can do this simply because even the __</a:t>
+            </a:r>
+            <a:r>
+              <a:rPr lang="en-US" baseline="0" dirty="0" err="1"/>
+              <a:t>init</a:t>
+            </a:r>
+            <a:r>
+              <a:rPr lang="en-US" baseline="0" dirty="0"/>
+              <a:t>__ function can be inherited. If you’re just going to “</a:t>
+            </a:r>
+            <a:r>
+              <a:rPr lang="en-US" baseline="0" dirty="0" err="1"/>
+              <a:t>def</a:t>
+            </a:r>
+            <a:r>
+              <a:rPr lang="en-US" baseline="0" dirty="0"/>
+              <a:t> __</a:t>
+            </a:r>
+            <a:r>
+              <a:rPr lang="en-US" baseline="0" dirty="0" err="1"/>
+              <a:t>init</a:t>
+            </a:r>
+            <a:r>
+              <a:rPr lang="en-US" baseline="0" dirty="0"/>
+              <a:t>__(self): super().__</a:t>
+            </a:r>
+            <a:r>
+              <a:rPr lang="en-US" baseline="0" dirty="0" err="1"/>
+              <a:t>init</a:t>
+            </a:r>
+            <a:r>
+              <a:rPr lang="en-US" baseline="0" dirty="0"/>
+              <a:t>__()” then you don’t even need to write that. </a:t>
             </a:r>
             <a:endParaRPr lang="en-US" dirty="0"/>
           </a:p>
@@ -824,7 +765,7 @@
             <a:spLocks noGrp="1"/>
           </p:cNvSpPr>
           <p:nvPr>
-            <p:ph type="sldNum" sz="quarter" idx="5"/>
+            <p:ph type="sldNum" sz="quarter" idx="10"/>
           </p:nvPr>
         </p:nvSpPr>
         <p:spPr/>
@@ -834,7 +775,7 @@
           <a:p>
             <a:fld id="{BDAAE321-3917-0140-B87E-FBAD3B4B5EF6}" type="slidenum">
               <a:rPr lang="en-US" smtClean="0"/>
-              <a:t>14</a:t>
+              <a:t>13</a:t>
             </a:fld>
             <a:endParaRPr lang="en-US"/>
           </a:p>
@@ -843,7 +784,7 @@
     </p:spTree>
     <p:extLst>
       <p:ext uri="{BB962C8B-B14F-4D97-AF65-F5344CB8AC3E}">
-        <p14:creationId xmlns:p14="http://schemas.microsoft.com/office/powerpoint/2010/main" val="2243112266"/>
+        <p14:creationId xmlns:p14="http://schemas.microsoft.com/office/powerpoint/2010/main" val="502024618"/>
       </p:ext>
     </p:extLst>
   </p:cSld>
@@ -919,6 +860,23 @@
             </a:r>
           </a:p>
           <a:p>
+            <a:pPr marL="0" marR="0" lvl="0" indent="0" algn="l" defTabSz="914400" rtl="0" eaLnBrk="1" fontAlgn="auto" latinLnBrk="0" hangingPunct="1">
+              <a:lnSpc>
+                <a:spcPct val="100000"/>
+              </a:lnSpc>
+              <a:spcBef>
+                <a:spcPts val="0"/>
+              </a:spcBef>
+              <a:spcAft>
+                <a:spcPts val="0"/>
+              </a:spcAft>
+              <a:buClrTx/>
+              <a:buSzTx/>
+              <a:buFontTx/>
+              <a:buNone/>
+              <a:tabLst/>
+              <a:defRPr/>
+            </a:pPr>
             <a:r>
               <a:rPr lang="en-US" dirty="0"/>
               <a:t>A good example of </a:t>
@@ -960,7 +918,7 @@
           <a:p>
             <a:fld id="{BDAAE321-3917-0140-B87E-FBAD3B4B5EF6}" type="slidenum">
               <a:rPr lang="en-US" smtClean="0"/>
-              <a:t>15</a:t>
+              <a:t>14</a:t>
             </a:fld>
             <a:endParaRPr lang="en-US"/>
           </a:p>
@@ -969,7 +927,7 @@
     </p:spTree>
     <p:extLst>
       <p:ext uri="{BB962C8B-B14F-4D97-AF65-F5344CB8AC3E}">
-        <p14:creationId xmlns:p14="http://schemas.microsoft.com/office/powerpoint/2010/main" val="994287842"/>
+        <p14:creationId xmlns:p14="http://schemas.microsoft.com/office/powerpoint/2010/main" val="2243112266"/>
       </p:ext>
     </p:extLst>
   </p:cSld>
@@ -1025,19 +983,62 @@
           <a:p>
             <a:r>
               <a:rPr lang="en-US" dirty="0"/>
-              <a:t>In case anyone hadn’t seen</a:t>
-            </a:r>
-            <a:r>
-              <a:rPr lang="en-US" baseline="0" dirty="0"/>
-              <a:t> it up to this point, </a:t>
-            </a:r>
-            <a:r>
-              <a:rPr lang="en-US" i="1" baseline="0" dirty="0"/>
-              <a:t>pass</a:t>
-            </a:r>
-            <a:r>
-              <a:rPr lang="en-US" i="0" baseline="0" dirty="0"/>
-              <a:t> is a python keyword that just means “do nothing” </a:t>
+              <a:t>Note verbally here that “</a:t>
+            </a:r>
+            <a:r>
+              <a:rPr lang="en-US" dirty="0" err="1"/>
+              <a:t>self.__class</a:t>
+            </a:r>
+            <a:r>
+              <a:rPr lang="en-US" dirty="0"/>
+              <a:t>__” is the same as saying “positive(…)” – it’s a way of invoking the class without having to type its actual name (what if the name changed?). This class is in the git repository under examples/classes/</a:t>
+            </a:r>
+            <a:r>
+              <a:rPr lang="en-US" dirty="0" err="1"/>
+              <a:t>positive.py</a:t>
+            </a:r>
+            <a:r>
+              <a:rPr lang="en-US" dirty="0"/>
+              <a:t>. </a:t>
+            </a:r>
+          </a:p>
+          <a:p>
+            <a:pPr marL="0" marR="0" lvl="0" indent="0" algn="l" defTabSz="914400" rtl="0" eaLnBrk="1" fontAlgn="auto" latinLnBrk="0" hangingPunct="1">
+              <a:lnSpc>
+                <a:spcPct val="100000"/>
+              </a:lnSpc>
+              <a:spcBef>
+                <a:spcPts val="0"/>
+              </a:spcBef>
+              <a:spcAft>
+                <a:spcPts val="0"/>
+              </a:spcAft>
+              <a:buClrTx/>
+              <a:buSzTx/>
+              <a:buFontTx/>
+              <a:buNone/>
+              <a:tabLst/>
+              <a:defRPr/>
+            </a:pPr>
+            <a:r>
+              <a:rPr lang="en-US" dirty="0"/>
+              <a:t>A good example of </a:t>
+            </a:r>
+            <a:r>
+              <a:rPr lang="en-US" i="1" dirty="0"/>
+              <a:t>__new__</a:t>
+            </a:r>
+            <a:r>
+              <a:rPr lang="en-US" i="0" dirty="0"/>
+              <a:t> returning a different class is the multizone object in VICE returning a </a:t>
+            </a:r>
+            <a:r>
+              <a:rPr lang="en-US" i="0" dirty="0" err="1"/>
+              <a:t>singlezone</a:t>
+            </a:r>
+            <a:r>
+              <a:rPr lang="en-US" i="0" dirty="0"/>
+              <a:t> object when the number of zones is equal to one. </a:t>
             </a:r>
             <a:endParaRPr lang="en-US" dirty="0"/>
           </a:p>
@@ -1050,7 +1051,7 @@
             <a:spLocks noGrp="1"/>
           </p:cNvSpPr>
           <p:nvPr>
-            <p:ph type="sldNum" sz="quarter" idx="10"/>
+            <p:ph type="sldNum" sz="quarter" idx="5"/>
           </p:nvPr>
         </p:nvSpPr>
         <p:spPr/>
@@ -1060,7 +1061,7 @@
           <a:p>
             <a:fld id="{BDAAE321-3917-0140-B87E-FBAD3B4B5EF6}" type="slidenum">
               <a:rPr lang="en-US" smtClean="0"/>
-              <a:t>20</a:t>
+              <a:t>15</a:t>
             </a:fld>
             <a:endParaRPr lang="en-US"/>
           </a:p>
@@ -1069,7 +1070,7 @@
     </p:spTree>
     <p:extLst>
       <p:ext uri="{BB962C8B-B14F-4D97-AF65-F5344CB8AC3E}">
-        <p14:creationId xmlns:p14="http://schemas.microsoft.com/office/powerpoint/2010/main" val="1309425973"/>
+        <p14:creationId xmlns:p14="http://schemas.microsoft.com/office/powerpoint/2010/main" val="4117832186"/>
       </p:ext>
     </p:extLst>
   </p:cSld>
@@ -1160,7 +1161,7 @@
           <a:p>
             <a:fld id="{BDAAE321-3917-0140-B87E-FBAD3B4B5EF6}" type="slidenum">
               <a:rPr lang="en-US" smtClean="0"/>
-              <a:t>21</a:t>
+              <a:t>20</a:t>
             </a:fld>
             <a:endParaRPr lang="en-US"/>
           </a:p>
@@ -1169,7 +1170,7 @@
     </p:spTree>
     <p:extLst>
       <p:ext uri="{BB962C8B-B14F-4D97-AF65-F5344CB8AC3E}">
-        <p14:creationId xmlns:p14="http://schemas.microsoft.com/office/powerpoint/2010/main" val="1054605821"/>
+        <p14:creationId xmlns:p14="http://schemas.microsoft.com/office/powerpoint/2010/main" val="1309425973"/>
       </p:ext>
     </p:extLst>
   </p:cSld>
@@ -1260,6 +1261,106 @@
           <a:p>
             <a:fld id="{BDAAE321-3917-0140-B87E-FBAD3B4B5EF6}" type="slidenum">
               <a:rPr lang="en-US" smtClean="0"/>
+              <a:t>21</a:t>
+            </a:fld>
+            <a:endParaRPr lang="en-US"/>
+          </a:p>
+        </p:txBody>
+      </p:sp>
+    </p:spTree>
+    <p:extLst>
+      <p:ext uri="{BB962C8B-B14F-4D97-AF65-F5344CB8AC3E}">
+        <p14:creationId xmlns:p14="http://schemas.microsoft.com/office/powerpoint/2010/main" val="1054605821"/>
+      </p:ext>
+    </p:extLst>
+  </p:cSld>
+  <p:clrMapOvr>
+    <a:masterClrMapping/>
+  </p:clrMapOvr>
+</p:notes>
+</file>
+
+<file path=ppt/notesSlides/notesSlide8.xml><?xml version="1.0" encoding="utf-8"?>
+<p:notes xmlns:a="http://schemas.openxmlformats.org/drawingml/2006/main" xmlns:r="http://schemas.openxmlformats.org/officeDocument/2006/relationships" xmlns:p="http://schemas.openxmlformats.org/presentationml/2006/main">
+  <p:cSld>
+    <p:spTree>
+      <p:nvGrpSpPr>
+        <p:cNvPr id="1" name=""/>
+        <p:cNvGrpSpPr/>
+        <p:nvPr/>
+      </p:nvGrpSpPr>
+      <p:grpSpPr>
+        <a:xfrm>
+          <a:off x="0" y="0"/>
+          <a:ext cx="0" cy="0"/>
+          <a:chOff x="0" y="0"/>
+          <a:chExt cx="0" cy="0"/>
+        </a:xfrm>
+      </p:grpSpPr>
+      <p:sp>
+        <p:nvSpPr>
+          <p:cNvPr id="2" name="Slide Image Placeholder 1"/>
+          <p:cNvSpPr>
+            <a:spLocks noGrp="1" noRot="1" noChangeAspect="1"/>
+          </p:cNvSpPr>
+          <p:nvPr>
+            <p:ph type="sldImg"/>
+          </p:nvPr>
+        </p:nvSpPr>
+        <p:spPr/>
+      </p:sp>
+      <p:sp>
+        <p:nvSpPr>
+          <p:cNvPr id="3" name="Notes Placeholder 2"/>
+          <p:cNvSpPr>
+            <a:spLocks noGrp="1"/>
+          </p:cNvSpPr>
+          <p:nvPr>
+            <p:ph type="body" idx="1"/>
+          </p:nvPr>
+        </p:nvSpPr>
+        <p:spPr/>
+        <p:txBody>
+          <a:bodyPr/>
+          <a:lstStyle/>
+          <a:p>
+            <a:r>
+              <a:rPr lang="en-US" dirty="0"/>
+              <a:t>In case anyone hadn’t seen</a:t>
+            </a:r>
+            <a:r>
+              <a:rPr lang="en-US" baseline="0" dirty="0"/>
+              <a:t> it up to this point, </a:t>
+            </a:r>
+            <a:r>
+              <a:rPr lang="en-US" i="1" baseline="0" dirty="0"/>
+              <a:t>pass</a:t>
+            </a:r>
+            <a:r>
+              <a:rPr lang="en-US" i="0" baseline="0" dirty="0"/>
+              <a:t> is a python keyword that just means “do nothing” </a:t>
+            </a:r>
+            <a:endParaRPr lang="en-US" dirty="0"/>
+          </a:p>
+        </p:txBody>
+      </p:sp>
+      <p:sp>
+        <p:nvSpPr>
+          <p:cNvPr id="4" name="Slide Number Placeholder 3"/>
+          <p:cNvSpPr>
+            <a:spLocks noGrp="1"/>
+          </p:cNvSpPr>
+          <p:nvPr>
+            <p:ph type="sldNum" sz="quarter" idx="10"/>
+          </p:nvPr>
+        </p:nvSpPr>
+        <p:spPr/>
+        <p:txBody>
+          <a:bodyPr/>
+          <a:lstStyle/>
+          <a:p>
+            <a:fld id="{BDAAE321-3917-0140-B87E-FBAD3B4B5EF6}" type="slidenum">
+              <a:rPr lang="en-US" smtClean="0"/>
               <a:t>22</a:t>
             </a:fld>
             <a:endParaRPr lang="en-US"/>
@@ -1279,7 +1380,7 @@
 </p:notes>
 </file>
 
-<file path=ppt/notesSlides/notesSlide8.xml><?xml version="1.0" encoding="utf-8"?>
+<file path=ppt/notesSlides/notesSlide9.xml><?xml version="1.0" encoding="utf-8"?>
 <p:notes xmlns:a="http://schemas.openxmlformats.org/drawingml/2006/main" xmlns:r="http://schemas.openxmlformats.org/officeDocument/2006/relationships" xmlns:p="http://schemas.openxmlformats.org/presentationml/2006/main">
   <p:cSld>
     <p:spTree>
@@ -9269,7 +9370,7 @@
           <p:nvPr/>
         </p:nvPicPr>
         <p:blipFill>
-          <a:blip r:embed="rId2">
+          <a:blip r:embed="rId3">
             <a:extLst>
               <a:ext uri="{28A0092B-C50C-407E-A947-70E740481C1C}">
                 <a14:useLocalDpi xmlns:a14="http://schemas.microsoft.com/office/drawing/2010/main" val="0"/>
@@ -10061,7 +10162,7 @@
         </p:nvSpPr>
         <p:spPr>
           <a:xfrm>
-            <a:off x="680321" y="2336872"/>
+            <a:off x="325479" y="2336872"/>
             <a:ext cx="4956204" cy="4295939"/>
           </a:xfrm>
         </p:spPr>
@@ -10246,10 +10347,10 @@
       </p:sp>
       <p:pic>
         <p:nvPicPr>
-          <p:cNvPr id="8" name="Picture 7">
+          <p:cNvPr id="5" name="Picture 4">
             <a:extLst>
               <a:ext uri="{FF2B5EF4-FFF2-40B4-BE49-F238E27FC236}">
-                <a16:creationId xmlns:a16="http://schemas.microsoft.com/office/drawing/2014/main" id="{EE787CBC-5721-3D48-A86B-B56DA4EC0E66}"/>
+                <a16:creationId xmlns:a16="http://schemas.microsoft.com/office/drawing/2014/main" id="{22A56CA0-B35C-3F46-9850-8AFAAC7A6C6B}"/>
               </a:ext>
             </a:extLst>
           </p:cNvPr>
@@ -10266,8 +10367,8 @@
         </p:blipFill>
         <p:spPr>
           <a:xfrm>
-            <a:off x="5649047" y="2255067"/>
-            <a:ext cx="6542953" cy="4377744"/>
+            <a:off x="5581858" y="2265396"/>
+            <a:ext cx="6610142" cy="4367415"/>
           </a:xfrm>
           <a:prstGeom prst="rect">
             <a:avLst/>
@@ -10358,7 +10459,7 @@
         </p:nvSpPr>
         <p:spPr>
           <a:xfrm>
-            <a:off x="680321" y="2336872"/>
+            <a:off x="325479" y="2336872"/>
             <a:ext cx="4956204" cy="4295939"/>
           </a:xfrm>
         </p:spPr>
@@ -10543,10 +10644,10 @@
       </p:sp>
       <p:pic>
         <p:nvPicPr>
-          <p:cNvPr id="5" name="Picture 4">
+          <p:cNvPr id="6" name="Picture 5">
             <a:extLst>
               <a:ext uri="{FF2B5EF4-FFF2-40B4-BE49-F238E27FC236}">
-                <a16:creationId xmlns:a16="http://schemas.microsoft.com/office/drawing/2014/main" id="{6561EE19-9FA9-5746-8017-054747855673}"/>
+                <a16:creationId xmlns:a16="http://schemas.microsoft.com/office/drawing/2014/main" id="{35302211-4187-2249-8F2A-65A9F83882AA}"/>
               </a:ext>
             </a:extLst>
           </p:cNvPr>
@@ -10563,8 +10664,8 @@
         </p:blipFill>
         <p:spPr>
           <a:xfrm>
-            <a:off x="5747667" y="2019870"/>
-            <a:ext cx="6330896" cy="4783540"/>
+            <a:off x="5445458" y="1760403"/>
+            <a:ext cx="6746542" cy="5097597"/>
           </a:xfrm>
           <a:prstGeom prst="rect">
             <a:avLst/>
@@ -10574,7 +10675,7 @@
     </p:spTree>
     <p:extLst>
       <p:ext uri="{BB962C8B-B14F-4D97-AF65-F5344CB8AC3E}">
-        <p14:creationId xmlns:p14="http://schemas.microsoft.com/office/powerpoint/2010/main" val="2126732098"/>
+        <p14:creationId xmlns:p14="http://schemas.microsoft.com/office/powerpoint/2010/main" val="1771904430"/>
       </p:ext>
     </p:extLst>
   </p:cSld>

</xml_diff>